<commit_message>
update with service diagram, vituralization slides
git-svn-id: file:///repo/trunk@148 7b6b0737-f4d6-4764-b6e6-6b822f93333f
</commit_message>
<xml_diff>
--- a/doc/CMAC_Lee_First_Interim_Report.pptx
+++ b/doc/CMAC_Lee_First_Interim_Report.pptx
@@ -5,10 +5,10 @@
     <p:sldMasterId id="2147483648" r:id="rId1"/>
   </p:sldMasterIdLst>
   <p:notesMasterIdLst>
-    <p:notesMasterId r:id="rId19"/>
+    <p:notesMasterId r:id="rId21"/>
   </p:notesMasterIdLst>
   <p:handoutMasterIdLst>
-    <p:handoutMasterId r:id="rId20"/>
+    <p:handoutMasterId r:id="rId22"/>
   </p:handoutMasterIdLst>
   <p:sldIdLst>
     <p:sldId id="256" r:id="rId2"/>
@@ -17,17 +17,19 @@
     <p:sldId id="270" r:id="rId5"/>
     <p:sldId id="271" r:id="rId6"/>
     <p:sldId id="272" r:id="rId7"/>
-    <p:sldId id="261" r:id="rId8"/>
-    <p:sldId id="267" r:id="rId9"/>
-    <p:sldId id="268" r:id="rId10"/>
-    <p:sldId id="266" r:id="rId11"/>
-    <p:sldId id="262" r:id="rId12"/>
-    <p:sldId id="273" r:id="rId13"/>
-    <p:sldId id="259" r:id="rId14"/>
-    <p:sldId id="263" r:id="rId15"/>
-    <p:sldId id="264" r:id="rId16"/>
-    <p:sldId id="269" r:id="rId17"/>
-    <p:sldId id="258" r:id="rId18"/>
+    <p:sldId id="274" r:id="rId8"/>
+    <p:sldId id="275" r:id="rId9"/>
+    <p:sldId id="261" r:id="rId10"/>
+    <p:sldId id="267" r:id="rId11"/>
+    <p:sldId id="268" r:id="rId12"/>
+    <p:sldId id="266" r:id="rId13"/>
+    <p:sldId id="262" r:id="rId14"/>
+    <p:sldId id="273" r:id="rId15"/>
+    <p:sldId id="259" r:id="rId16"/>
+    <p:sldId id="263" r:id="rId17"/>
+    <p:sldId id="264" r:id="rId18"/>
+    <p:sldId id="269" r:id="rId19"/>
+    <p:sldId id="258" r:id="rId20"/>
   </p:sldIdLst>
   <p:sldSz cx="9144000" cy="6858000" type="screen4x3"/>
   <p:notesSz cx="6858000" cy="9144000"/>
@@ -241,7 +243,7 @@
           <a:p>
             <a:fld id="{55223490-2B30-6B43-ABE0-ADA5297D4081}" type="datetimeFigureOut">
               <a:rPr lang="en-US" smtClean="0"/>
-              <a:t>3/10/13</a:t>
+              <a:t>3/11/13</a:t>
             </a:fld>
             <a:endParaRPr lang="en-US"/>
           </a:p>
@@ -436,7 +438,7 @@
               <a:pPr>
                 <a:defRPr/>
               </a:pPr>
-              <a:t>3/10/13</a:t>
+              <a:t>3/11/13</a:t>
             </a:fld>
             <a:endParaRPr lang="en-US"/>
           </a:p>
@@ -952,7 +954,7 @@
             </a:pPr>
             <a:fld id="{45EDCE9C-6D2E-BF48-B473-4A27F4F9E0B5}" type="datetime1">
               <a:rPr lang="en-US" smtClean="0"/>
-              <a:t>3/10/13</a:t>
+              <a:t>3/11/13</a:t>
             </a:fld>
             <a:endParaRPr lang="en-US"/>
           </a:p>
@@ -1146,7 +1148,7 @@
             </a:pPr>
             <a:fld id="{4E67DB47-F9DC-8746-B63D-5DCF440D8382}" type="datetime1">
               <a:rPr lang="en-US" smtClean="0"/>
-              <a:t>3/10/13</a:t>
+              <a:t>3/11/13</a:t>
             </a:fld>
             <a:endParaRPr lang="en-US"/>
           </a:p>
@@ -1350,7 +1352,7 @@
             </a:pPr>
             <a:fld id="{574C8B26-8C07-AE47-AF40-813D3F649017}" type="datetime1">
               <a:rPr lang="en-US" smtClean="0"/>
-              <a:t>3/10/13</a:t>
+              <a:t>3/11/13</a:t>
             </a:fld>
             <a:endParaRPr lang="en-US"/>
           </a:p>
@@ -1544,7 +1546,7 @@
             </a:pPr>
             <a:fld id="{DDD8B1A2-1D8F-A446-9C4A-E12FC0563558}" type="datetime1">
               <a:rPr lang="en-US" smtClean="0"/>
-              <a:t>3/10/13</a:t>
+              <a:t>3/11/13</a:t>
             </a:fld>
             <a:endParaRPr lang="en-US"/>
           </a:p>
@@ -1814,7 +1816,7 @@
             </a:pPr>
             <a:fld id="{BB0A81BC-525F-554A-9C34-30EEB7FFF502}" type="datetime1">
               <a:rPr lang="en-US" smtClean="0"/>
-              <a:t>3/10/13</a:t>
+              <a:t>3/11/13</a:t>
             </a:fld>
             <a:endParaRPr lang="en-US"/>
           </a:p>
@@ -2126,7 +2128,7 @@
             </a:pPr>
             <a:fld id="{AAD1F828-F344-A746-9454-7C07AB599B1A}" type="datetime1">
               <a:rPr lang="en-US" smtClean="0"/>
-              <a:t>3/10/13</a:t>
+              <a:t>3/11/13</a:t>
             </a:fld>
             <a:endParaRPr lang="en-US"/>
           </a:p>
@@ -2572,7 +2574,7 @@
             </a:pPr>
             <a:fld id="{ED0D3EB3-2FA1-4F49-9CF2-AB9E12B8A50D}" type="datetime1">
               <a:rPr lang="en-US" smtClean="0"/>
-              <a:t>3/10/13</a:t>
+              <a:t>3/11/13</a:t>
             </a:fld>
             <a:endParaRPr lang="en-US"/>
           </a:p>
@@ -2714,7 +2716,7 @@
             </a:pPr>
             <a:fld id="{D0FDD52E-41D7-284B-AFC4-6BD0164E6E15}" type="datetime1">
               <a:rPr lang="en-US" smtClean="0"/>
-              <a:t>3/10/13</a:t>
+              <a:t>3/11/13</a:t>
             </a:fld>
             <a:endParaRPr lang="en-US"/>
           </a:p>
@@ -2833,7 +2835,7 @@
             </a:pPr>
             <a:fld id="{50CB18CD-2D0F-6F4F-B1F6-FCA5F58F8DA4}" type="datetime1">
               <a:rPr lang="en-US" smtClean="0"/>
-              <a:t>3/10/13</a:t>
+              <a:t>3/11/13</a:t>
             </a:fld>
             <a:endParaRPr lang="en-US"/>
           </a:p>
@@ -3134,7 +3136,7 @@
             </a:pPr>
             <a:fld id="{8FAC375A-0267-B342-B138-DC0A8932450C}" type="datetime1">
               <a:rPr lang="en-US" smtClean="0"/>
-              <a:t>3/10/13</a:t>
+              <a:t>3/11/13</a:t>
             </a:fld>
             <a:endParaRPr lang="en-US"/>
           </a:p>
@@ -3417,7 +3419,7 @@
             </a:pPr>
             <a:fld id="{08028F92-D9C7-A944-B6D4-355E6F4AC834}" type="datetime1">
               <a:rPr lang="en-US" smtClean="0"/>
-              <a:t>3/10/13</a:t>
+              <a:t>3/11/13</a:t>
             </a:fld>
             <a:endParaRPr lang="en-US"/>
           </a:p>
@@ -3716,7 +3718,7 @@
             </a:pPr>
             <a:fld id="{E2E049DE-80B2-B84B-A944-C57EC2D9D187}" type="datetime1">
               <a:rPr lang="en-US" smtClean="0"/>
-              <a:t>3/10/13</a:t>
+              <a:t>3/11/13</a:t>
             </a:fld>
             <a:endParaRPr lang="en-US"/>
           </a:p>
@@ -4453,14 +4455,20 @@
             <p:ph type="title"/>
           </p:nvPr>
         </p:nvSpPr>
-        <p:spPr/>
+        <p:spPr>
+          <a:xfrm>
+            <a:off x="1880152" y="103800"/>
+            <a:ext cx="5762480" cy="1143000"/>
+          </a:xfrm>
+        </p:spPr>
         <p:txBody>
           <a:bodyPr/>
           <a:lstStyle/>
           <a:p>
+            <a:pPr algn="l"/>
             <a:r>
               <a:rPr lang="en-US" sz="3600" dirty="0" smtClean="0"/>
-              <a:t>Project Cost Status</a:t>
+              <a:t>Project Schedule Planned</a:t>
             </a:r>
             <a:endParaRPr lang="en-US" sz="3600" dirty="0"/>
           </a:p>
@@ -4476,114 +4484,46 @@
         </p:nvPicPr>
         <p:blipFill rotWithShape="1">
           <a:blip r:embed="rId2"/>
-          <a:srcRect t="2262"/>
+          <a:srcRect r="1235"/>
           <a:stretch/>
         </p:blipFill>
         <p:spPr>
           <a:xfrm>
-            <a:off x="1167063" y="3348790"/>
-            <a:ext cx="6291759" cy="3361791"/>
+            <a:off x="1394326" y="1230486"/>
+            <a:ext cx="6506412" cy="2371603"/>
           </a:xfrm>
           <a:prstGeom prst="rect">
             <a:avLst/>
           </a:prstGeom>
         </p:spPr>
       </p:pic>
-      <p:sp>
-        <p:nvSpPr>
-          <p:cNvPr id="5" name="TextBox 4"/>
-          <p:cNvSpPr txBox="1"/>
+      <p:pic>
+        <p:nvPicPr>
+          <p:cNvPr id="7" name="Picture 6"/>
+          <p:cNvPicPr>
+            <a:picLocks noChangeAspect="1"/>
+          </p:cNvPicPr>
           <p:nvPr/>
-        </p:nvSpPr>
+        </p:nvPicPr>
+        <p:blipFill>
+          <a:blip r:embed="rId3"/>
+          <a:stretch>
+            <a:fillRect/>
+          </a:stretch>
+        </p:blipFill>
         <p:spPr>
           <a:xfrm>
-            <a:off x="712537" y="1384218"/>
-            <a:ext cx="7656095" cy="1815882"/>
+            <a:off x="581422" y="3532600"/>
+            <a:ext cx="5924550" cy="3219450"/>
           </a:xfrm>
           <a:prstGeom prst="rect">
             <a:avLst/>
           </a:prstGeom>
-          <a:noFill/>
         </p:spPr>
-        <p:txBody>
-          <a:bodyPr wrap="square" rtlCol="0">
-            <a:spAutoFit/>
-          </a:bodyPr>
-          <a:lstStyle/>
-          <a:p>
-            <a:pPr marL="285750" indent="-285750">
-              <a:buFont typeface="Arial"/>
-              <a:buChar char="•"/>
-            </a:pPr>
-            <a:r>
-              <a:rPr lang="en-US" sz="1600" dirty="0" smtClean="0">
-                <a:latin typeface="Comic Sans MS"/>
-                <a:cs typeface="Comic Sans MS"/>
-              </a:rPr>
-              <a:t>Total project budget for Year 1 is $303K.</a:t>
-            </a:r>
-          </a:p>
-          <a:p>
-            <a:pPr marL="285750" indent="-285750">
-              <a:buFont typeface="Arial"/>
-              <a:buChar char="•"/>
-            </a:pPr>
-            <a:r>
-              <a:rPr lang="en-US" sz="1600" dirty="0" smtClean="0">
-                <a:latin typeface="Comic Sans MS"/>
-                <a:cs typeface="Comic Sans MS"/>
-              </a:rPr>
-              <a:t>As of the end of February, the project cost is overrun by $16K.</a:t>
-            </a:r>
-          </a:p>
-          <a:p>
-            <a:pPr marL="285750" indent="-285750">
-              <a:buFont typeface="Arial"/>
-              <a:buChar char="•"/>
-            </a:pPr>
-            <a:r>
-              <a:rPr lang="en-US" sz="1600" dirty="0" smtClean="0">
-                <a:latin typeface="Comic Sans MS"/>
-                <a:cs typeface="Comic Sans MS"/>
-              </a:rPr>
-              <a:t>Overrun by $16K is due to the purchase and installation of the hardware. </a:t>
-            </a:r>
-          </a:p>
-          <a:p>
-            <a:pPr marL="285750" indent="-285750">
-              <a:buFont typeface="Arial"/>
-              <a:buChar char="•"/>
-            </a:pPr>
-            <a:r>
-              <a:rPr lang="en-US" sz="1600" dirty="0" smtClean="0">
-                <a:latin typeface="Comic Sans MS"/>
-                <a:cs typeface="Comic Sans MS"/>
-              </a:rPr>
-              <a:t>While $20K was planned for the hardware purchase and installation, the actual cost was $36K.</a:t>
-            </a:r>
-          </a:p>
-          <a:p>
-            <a:pPr marL="285750" indent="-285750">
-              <a:buFont typeface="Arial"/>
-              <a:buChar char="•"/>
-            </a:pPr>
-            <a:r>
-              <a:rPr lang="en-US" sz="1600" dirty="0" smtClean="0">
-                <a:latin typeface="Comic Sans MS"/>
-                <a:cs typeface="Comic Sans MS"/>
-              </a:rPr>
-              <a:t>The overrun will be corrected by the gradual reduction of the labor cost through the rest of the year. </a:t>
-            </a:r>
-            <a:endParaRPr lang="en-US" sz="1600" dirty="0">
-              <a:latin typeface="Comic Sans MS"/>
-              <a:cs typeface="Comic Sans MS"/>
-            </a:endParaRPr>
-          </a:p>
-        </p:txBody>
-      </p:sp>
-      <p:sp>
-        <p:nvSpPr>
-          <p:cNvPr id="6" name="Slide Number Placeholder 5"/>
+      </p:pic>
+      <p:sp>
+        <p:nvSpPr>
+          <p:cNvPr id="8" name="Slide Number Placeholder 7"/>
           <p:cNvSpPr>
             <a:spLocks noGrp="1"/>
           </p:cNvSpPr>
@@ -4613,7 +4553,7 @@
     </p:spTree>
     <p:extLst>
       <p:ext uri="{BB962C8B-B14F-4D97-AF65-F5344CB8AC3E}">
-        <p14:creationId xmlns:p14="http://schemas.microsoft.com/office/powerpoint/2010/main" val="2990128740"/>
+        <p14:creationId xmlns:p14="http://schemas.microsoft.com/office/powerpoint/2010/main" val="3130814812"/>
       </p:ext>
     </p:extLst>
   </p:cSld>
@@ -4640,9 +4580,155 @@
           <a:chExt cx="0" cy="0"/>
         </a:xfrm>
       </p:grpSpPr>
-      <p:sp>
-        <p:nvSpPr>
-          <p:cNvPr id="2" name="Title 1"/>
+      <p:pic>
+        <p:nvPicPr>
+          <p:cNvPr id="4" name="Picture 3"/>
+          <p:cNvPicPr>
+            <a:picLocks noChangeAspect="1"/>
+          </p:cNvPicPr>
+          <p:nvPr/>
+        </p:nvPicPr>
+        <p:blipFill rotWithShape="1">
+          <a:blip r:embed="rId2"/>
+          <a:srcRect r="1235"/>
+          <a:stretch/>
+        </p:blipFill>
+        <p:spPr>
+          <a:xfrm>
+            <a:off x="1394326" y="1230486"/>
+            <a:ext cx="6506412" cy="2371603"/>
+          </a:xfrm>
+          <a:prstGeom prst="rect">
+            <a:avLst/>
+          </a:prstGeom>
+        </p:spPr>
+      </p:pic>
+      <p:sp>
+        <p:nvSpPr>
+          <p:cNvPr id="9" name="TextBox 8"/>
+          <p:cNvSpPr txBox="1"/>
+          <p:nvPr/>
+        </p:nvSpPr>
+        <p:spPr>
+          <a:xfrm>
+            <a:off x="7188119" y="3852573"/>
+            <a:ext cx="1470523" cy="261610"/>
+          </a:xfrm>
+          <a:prstGeom prst="rect">
+            <a:avLst/>
+          </a:prstGeom>
+          <a:solidFill>
+            <a:srgbClr val="008000"/>
+          </a:solidFill>
+        </p:spPr>
+        <p:txBody>
+          <a:bodyPr wrap="square" lIns="0" tIns="0" rIns="0" bIns="45720" rtlCol="0">
+            <a:spAutoFit/>
+          </a:bodyPr>
+          <a:lstStyle/>
+          <a:p>
+            <a:pPr algn="ctr"/>
+            <a:r>
+              <a:rPr lang="en-US" sz="1400" dirty="0" smtClean="0"/>
+              <a:t>Complete</a:t>
+            </a:r>
+            <a:endParaRPr lang="en-US" sz="1400" dirty="0"/>
+          </a:p>
+        </p:txBody>
+      </p:sp>
+      <p:sp>
+        <p:nvSpPr>
+          <p:cNvPr id="8" name="TextBox 7"/>
+          <p:cNvSpPr txBox="1"/>
+          <p:nvPr/>
+        </p:nvSpPr>
+        <p:spPr>
+          <a:xfrm>
+            <a:off x="7188120" y="4114183"/>
+            <a:ext cx="1470523" cy="261610"/>
+          </a:xfrm>
+          <a:prstGeom prst="rect">
+            <a:avLst/>
+          </a:prstGeom>
+          <a:solidFill>
+            <a:srgbClr val="FFE53E"/>
+          </a:solidFill>
+        </p:spPr>
+        <p:txBody>
+          <a:bodyPr wrap="square" lIns="0" tIns="0" rIns="0" bIns="45720" rtlCol="0">
+            <a:spAutoFit/>
+          </a:bodyPr>
+          <a:lstStyle/>
+          <a:p>
+            <a:pPr algn="ctr"/>
+            <a:r>
+              <a:rPr lang="en-US" sz="1400" dirty="0" smtClean="0"/>
+              <a:t>Partially complete</a:t>
+            </a:r>
+            <a:endParaRPr lang="en-US" sz="1400" dirty="0"/>
+          </a:p>
+        </p:txBody>
+      </p:sp>
+      <p:sp>
+        <p:nvSpPr>
+          <p:cNvPr id="10" name="TextBox 9"/>
+          <p:cNvSpPr txBox="1"/>
+          <p:nvPr/>
+        </p:nvSpPr>
+        <p:spPr>
+          <a:xfrm>
+            <a:off x="7188119" y="4370240"/>
+            <a:ext cx="1470524" cy="261610"/>
+          </a:xfrm>
+          <a:prstGeom prst="rect">
+            <a:avLst/>
+          </a:prstGeom>
+          <a:solidFill>
+            <a:srgbClr val="FF0000"/>
+          </a:solidFill>
+        </p:spPr>
+        <p:txBody>
+          <a:bodyPr wrap="square" lIns="0" tIns="0" rIns="0" bIns="45720" rtlCol="0">
+            <a:spAutoFit/>
+          </a:bodyPr>
+          <a:lstStyle/>
+          <a:p>
+            <a:pPr algn="ctr"/>
+            <a:r>
+              <a:rPr lang="en-US" sz="1400" dirty="0" smtClean="0"/>
+              <a:t>Not started</a:t>
+            </a:r>
+            <a:endParaRPr lang="en-US" sz="1400" dirty="0"/>
+          </a:p>
+        </p:txBody>
+      </p:sp>
+      <p:pic>
+        <p:nvPicPr>
+          <p:cNvPr id="14" name="Picture 13"/>
+          <p:cNvPicPr>
+            <a:picLocks noChangeAspect="1"/>
+          </p:cNvPicPr>
+          <p:nvPr/>
+        </p:nvPicPr>
+        <p:blipFill>
+          <a:blip r:embed="rId3"/>
+          <a:stretch>
+            <a:fillRect/>
+          </a:stretch>
+        </p:blipFill>
+        <p:spPr>
+          <a:xfrm>
+            <a:off x="600516" y="3544886"/>
+            <a:ext cx="5886450" cy="3200400"/>
+          </a:xfrm>
+          <a:prstGeom prst="rect">
+            <a:avLst/>
+          </a:prstGeom>
+        </p:spPr>
+      </p:pic>
+      <p:sp>
+        <p:nvSpPr>
+          <p:cNvPr id="16" name="Title 1"/>
           <p:cNvSpPr>
             <a:spLocks noGrp="1"/>
           </p:cNvSpPr>
@@ -4650,14 +4736,20 @@
             <p:ph type="title"/>
           </p:nvPr>
         </p:nvSpPr>
-        <p:spPr/>
+        <p:spPr>
+          <a:xfrm>
+            <a:off x="1880152" y="103800"/>
+            <a:ext cx="5762480" cy="1143000"/>
+          </a:xfrm>
+        </p:spPr>
         <p:txBody>
           <a:bodyPr/>
           <a:lstStyle/>
           <a:p>
+            <a:pPr algn="l"/>
             <a:r>
               <a:rPr lang="en-US" sz="3600" dirty="0" smtClean="0"/>
-              <a:t>Educational and Outreach Status</a:t>
+              <a:t>Project Schedule Status</a:t>
             </a:r>
             <a:endParaRPr lang="en-US" sz="3600" dirty="0"/>
           </a:p>
@@ -4665,124 +4757,7 @@
       </p:sp>
       <p:sp>
         <p:nvSpPr>
-          <p:cNvPr id="3" name="Content Placeholder 2"/>
-          <p:cNvSpPr>
-            <a:spLocks noGrp="1"/>
-          </p:cNvSpPr>
-          <p:nvPr>
-            <p:ph idx="1"/>
-          </p:nvPr>
-        </p:nvSpPr>
-        <p:spPr>
-          <a:xfrm>
-            <a:off x="457200" y="1305116"/>
-            <a:ext cx="8229600" cy="5245410"/>
-          </a:xfrm>
-        </p:spPr>
-        <p:txBody>
-          <a:bodyPr/>
-          <a:lstStyle/>
-          <a:p>
-            <a:r>
-              <a:rPr lang="en-US" sz="1400" dirty="0"/>
-              <a:t>Presented </a:t>
-            </a:r>
-            <a:r>
-              <a:rPr lang="en-US" sz="1400" dirty="0" smtClean="0"/>
-              <a:t>the planned work and current work status of this </a:t>
-            </a:r>
-            <a:r>
-              <a:rPr lang="en-US" sz="1400" dirty="0"/>
-              <a:t>CMAC project </a:t>
-            </a:r>
-            <a:r>
-              <a:rPr lang="en-US" sz="1400" dirty="0" smtClean="0"/>
-              <a:t>at </a:t>
-            </a:r>
-            <a:r>
-              <a:rPr lang="en-US" sz="1400" dirty="0"/>
-              <a:t>2012 AGU Fall meeting in San Francisco, CA, December 2012. </a:t>
-            </a:r>
-          </a:p>
-          <a:p>
-            <a:endParaRPr lang="en-US" sz="1400" dirty="0" smtClean="0"/>
-          </a:p>
-          <a:p>
-            <a:endParaRPr lang="en-US" sz="1400" dirty="0" smtClean="0"/>
-          </a:p>
-          <a:p>
-            <a:pPr marL="0" indent="0">
-              <a:buNone/>
-            </a:pPr>
-            <a:endParaRPr lang="en-US" sz="1400" dirty="0"/>
-          </a:p>
-          <a:p>
-            <a:pPr marL="0" indent="0">
-              <a:buNone/>
-            </a:pPr>
-            <a:endParaRPr lang="en-US" sz="1400" dirty="0"/>
-          </a:p>
-          <a:p>
-            <a:endParaRPr lang="en-US" sz="1400" dirty="0" smtClean="0"/>
-          </a:p>
-          <a:p>
-            <a:endParaRPr lang="en-US" sz="1400" dirty="0"/>
-          </a:p>
-          <a:p>
-            <a:endParaRPr lang="en-US" sz="1400" dirty="0" smtClean="0"/>
-          </a:p>
-          <a:p>
-            <a:endParaRPr lang="en-US" sz="1400" dirty="0" smtClean="0"/>
-          </a:p>
-          <a:p>
-            <a:pPr marL="0" indent="0">
-              <a:buNone/>
-            </a:pPr>
-            <a:endParaRPr lang="en-US" sz="1400" dirty="0"/>
-          </a:p>
-          <a:p>
-            <a:r>
-              <a:rPr lang="en-US" sz="1400" dirty="0" smtClean="0"/>
-              <a:t>This CMAC project agreed to work with CCS and make a demonstration of the tool in April, 2013. Upon a positive response, the tool will be used as an educational tool for the summer school. </a:t>
-            </a:r>
-          </a:p>
-          <a:p>
-            <a:r>
-              <a:rPr lang="en-US" sz="1400" dirty="0" smtClean="0"/>
-              <a:t>Design and requirements for the education tool have been developed: the user interface should be web-browser based; the web server should support &gt;30 simultaneous web-service requests.</a:t>
-            </a:r>
-          </a:p>
-          <a:p>
-            <a:r>
-              <a:rPr lang="en-US" sz="1400" dirty="0" smtClean="0"/>
-              <a:t>Several web-services to support model-data </a:t>
-            </a:r>
-            <a:r>
-              <a:rPr lang="en-US" sz="1400" dirty="0" err="1" smtClean="0"/>
-              <a:t>intercomparisons</a:t>
-            </a:r>
-            <a:r>
-              <a:rPr lang="en-US" sz="1400" dirty="0"/>
-              <a:t> </a:t>
-            </a:r>
-            <a:r>
-              <a:rPr lang="en-US" sz="1400" dirty="0" smtClean="0"/>
-              <a:t>are being developed: analysis and visualization of 2D/3D variable multi-annual means using Coupled Model </a:t>
-            </a:r>
-            <a:r>
-              <a:rPr lang="en-US" sz="1400" dirty="0" err="1" smtClean="0"/>
-              <a:t>Intercomparison</a:t>
-            </a:r>
-            <a:r>
-              <a:rPr lang="en-US" sz="1400" dirty="0" smtClean="0"/>
-              <a:t> Project Phase 5 (CMIP5) model outputs and Obs4MIPs datasets. </a:t>
-            </a:r>
-          </a:p>
-        </p:txBody>
-      </p:sp>
-      <p:sp>
-        <p:nvSpPr>
-          <p:cNvPr id="4" name="Slide Number Placeholder 3"/>
+          <p:cNvPr id="17" name="Slide Number Placeholder 16"/>
           <p:cNvSpPr>
             <a:spLocks noGrp="1"/>
           </p:cNvSpPr>
@@ -4804,6 +4779,402 @@
                 <a:defRPr/>
               </a:pPr>
               <a:t>10</a:t>
+            </a:fld>
+            <a:endParaRPr lang="en-US"/>
+          </a:p>
+        </p:txBody>
+      </p:sp>
+    </p:spTree>
+    <p:extLst>
+      <p:ext uri="{BB962C8B-B14F-4D97-AF65-F5344CB8AC3E}">
+        <p14:creationId xmlns:p14="http://schemas.microsoft.com/office/powerpoint/2010/main" val="125852812"/>
+      </p:ext>
+    </p:extLst>
+  </p:cSld>
+  <p:clrMapOvr>
+    <a:masterClrMapping/>
+  </p:clrMapOvr>
+</p:sld>
+</file>
+
+<file path=ppt/slides/slide12.xml><?xml version="1.0" encoding="utf-8"?>
+<p:sld xmlns:a="http://schemas.openxmlformats.org/drawingml/2006/main" xmlns:r="http://schemas.openxmlformats.org/officeDocument/2006/relationships" xmlns:p="http://schemas.openxmlformats.org/presentationml/2006/main">
+  <p:cSld>
+    <p:spTree>
+      <p:nvGrpSpPr>
+        <p:cNvPr id="1" name=""/>
+        <p:cNvGrpSpPr/>
+        <p:nvPr/>
+      </p:nvGrpSpPr>
+      <p:grpSpPr>
+        <a:xfrm>
+          <a:off x="0" y="0"/>
+          <a:ext cx="0" cy="0"/>
+          <a:chOff x="0" y="0"/>
+          <a:chExt cx="0" cy="0"/>
+        </a:xfrm>
+      </p:grpSpPr>
+      <p:sp>
+        <p:nvSpPr>
+          <p:cNvPr id="2" name="Title 1"/>
+          <p:cNvSpPr>
+            <a:spLocks noGrp="1"/>
+          </p:cNvSpPr>
+          <p:nvPr>
+            <p:ph type="title"/>
+          </p:nvPr>
+        </p:nvSpPr>
+        <p:spPr/>
+        <p:txBody>
+          <a:bodyPr/>
+          <a:lstStyle/>
+          <a:p>
+            <a:r>
+              <a:rPr lang="en-US" sz="3600" dirty="0" smtClean="0"/>
+              <a:t>Project Cost Status</a:t>
+            </a:r>
+            <a:endParaRPr lang="en-US" sz="3600" dirty="0"/>
+          </a:p>
+        </p:txBody>
+      </p:sp>
+      <p:pic>
+        <p:nvPicPr>
+          <p:cNvPr id="4" name="Picture 3"/>
+          <p:cNvPicPr>
+            <a:picLocks noChangeAspect="1"/>
+          </p:cNvPicPr>
+          <p:nvPr/>
+        </p:nvPicPr>
+        <p:blipFill rotWithShape="1">
+          <a:blip r:embed="rId2"/>
+          <a:srcRect t="2262"/>
+          <a:stretch/>
+        </p:blipFill>
+        <p:spPr>
+          <a:xfrm>
+            <a:off x="1167063" y="3348790"/>
+            <a:ext cx="6291759" cy="3361791"/>
+          </a:xfrm>
+          <a:prstGeom prst="rect">
+            <a:avLst/>
+          </a:prstGeom>
+        </p:spPr>
+      </p:pic>
+      <p:sp>
+        <p:nvSpPr>
+          <p:cNvPr id="5" name="TextBox 4"/>
+          <p:cNvSpPr txBox="1"/>
+          <p:nvPr/>
+        </p:nvSpPr>
+        <p:spPr>
+          <a:xfrm>
+            <a:off x="712537" y="1384218"/>
+            <a:ext cx="7656095" cy="1815882"/>
+          </a:xfrm>
+          <a:prstGeom prst="rect">
+            <a:avLst/>
+          </a:prstGeom>
+          <a:noFill/>
+        </p:spPr>
+        <p:txBody>
+          <a:bodyPr wrap="square" rtlCol="0">
+            <a:spAutoFit/>
+          </a:bodyPr>
+          <a:lstStyle/>
+          <a:p>
+            <a:pPr marL="285750" indent="-285750">
+              <a:buFont typeface="Arial"/>
+              <a:buChar char="•"/>
+            </a:pPr>
+            <a:r>
+              <a:rPr lang="en-US" sz="1600" dirty="0" smtClean="0">
+                <a:latin typeface="Comic Sans MS"/>
+                <a:cs typeface="Comic Sans MS"/>
+              </a:rPr>
+              <a:t>Total project budget for Year 1 is $303K.</a:t>
+            </a:r>
+          </a:p>
+          <a:p>
+            <a:pPr marL="285750" indent="-285750">
+              <a:buFont typeface="Arial"/>
+              <a:buChar char="•"/>
+            </a:pPr>
+            <a:r>
+              <a:rPr lang="en-US" sz="1600" dirty="0" smtClean="0">
+                <a:latin typeface="Comic Sans MS"/>
+                <a:cs typeface="Comic Sans MS"/>
+              </a:rPr>
+              <a:t>As of the end of February, the project cost is overrun by $16K.</a:t>
+            </a:r>
+          </a:p>
+          <a:p>
+            <a:pPr marL="285750" indent="-285750">
+              <a:buFont typeface="Arial"/>
+              <a:buChar char="•"/>
+            </a:pPr>
+            <a:r>
+              <a:rPr lang="en-US" sz="1600" dirty="0" smtClean="0">
+                <a:latin typeface="Comic Sans MS"/>
+                <a:cs typeface="Comic Sans MS"/>
+              </a:rPr>
+              <a:t>Overrun by $16K is due to the purchase and installation of the hardware. </a:t>
+            </a:r>
+          </a:p>
+          <a:p>
+            <a:pPr marL="285750" indent="-285750">
+              <a:buFont typeface="Arial"/>
+              <a:buChar char="•"/>
+            </a:pPr>
+            <a:r>
+              <a:rPr lang="en-US" sz="1600" dirty="0" smtClean="0">
+                <a:latin typeface="Comic Sans MS"/>
+                <a:cs typeface="Comic Sans MS"/>
+              </a:rPr>
+              <a:t>While $20K was planned for the hardware purchase and installation, the actual cost was $36K.</a:t>
+            </a:r>
+          </a:p>
+          <a:p>
+            <a:pPr marL="285750" indent="-285750">
+              <a:buFont typeface="Arial"/>
+              <a:buChar char="•"/>
+            </a:pPr>
+            <a:r>
+              <a:rPr lang="en-US" sz="1600" dirty="0" smtClean="0">
+                <a:latin typeface="Comic Sans MS"/>
+                <a:cs typeface="Comic Sans MS"/>
+              </a:rPr>
+              <a:t>The overrun will be corrected by the gradual reduction of the labor cost through the rest of the year. </a:t>
+            </a:r>
+            <a:endParaRPr lang="en-US" sz="1600" dirty="0">
+              <a:latin typeface="Comic Sans MS"/>
+              <a:cs typeface="Comic Sans MS"/>
+            </a:endParaRPr>
+          </a:p>
+        </p:txBody>
+      </p:sp>
+      <p:sp>
+        <p:nvSpPr>
+          <p:cNvPr id="6" name="Slide Number Placeholder 5"/>
+          <p:cNvSpPr>
+            <a:spLocks noGrp="1"/>
+          </p:cNvSpPr>
+          <p:nvPr>
+            <p:ph type="sldNum" sz="quarter" idx="12"/>
+          </p:nvPr>
+        </p:nvSpPr>
+        <p:spPr/>
+        <p:txBody>
+          <a:bodyPr/>
+          <a:lstStyle/>
+          <a:p>
+            <a:pPr>
+              <a:defRPr/>
+            </a:pPr>
+            <a:fld id="{11C29698-AE0C-CC43-ACA3-6C4B510D6C4C}" type="slidenum">
+              <a:rPr lang="en-US" smtClean="0"/>
+              <a:pPr>
+                <a:defRPr/>
+              </a:pPr>
+              <a:t>11</a:t>
+            </a:fld>
+            <a:endParaRPr lang="en-US"/>
+          </a:p>
+        </p:txBody>
+      </p:sp>
+    </p:spTree>
+    <p:extLst>
+      <p:ext uri="{BB962C8B-B14F-4D97-AF65-F5344CB8AC3E}">
+        <p14:creationId xmlns:p14="http://schemas.microsoft.com/office/powerpoint/2010/main" val="2990128740"/>
+      </p:ext>
+    </p:extLst>
+  </p:cSld>
+  <p:clrMapOvr>
+    <a:masterClrMapping/>
+  </p:clrMapOvr>
+</p:sld>
+</file>
+
+<file path=ppt/slides/slide13.xml><?xml version="1.0" encoding="utf-8"?>
+<p:sld xmlns:a="http://schemas.openxmlformats.org/drawingml/2006/main" xmlns:r="http://schemas.openxmlformats.org/officeDocument/2006/relationships" xmlns:p="http://schemas.openxmlformats.org/presentationml/2006/main">
+  <p:cSld>
+    <p:spTree>
+      <p:nvGrpSpPr>
+        <p:cNvPr id="1" name=""/>
+        <p:cNvGrpSpPr/>
+        <p:nvPr/>
+      </p:nvGrpSpPr>
+      <p:grpSpPr>
+        <a:xfrm>
+          <a:off x="0" y="0"/>
+          <a:ext cx="0" cy="0"/>
+          <a:chOff x="0" y="0"/>
+          <a:chExt cx="0" cy="0"/>
+        </a:xfrm>
+      </p:grpSpPr>
+      <p:sp>
+        <p:nvSpPr>
+          <p:cNvPr id="2" name="Title 1"/>
+          <p:cNvSpPr>
+            <a:spLocks noGrp="1"/>
+          </p:cNvSpPr>
+          <p:nvPr>
+            <p:ph type="title"/>
+          </p:nvPr>
+        </p:nvSpPr>
+        <p:spPr/>
+        <p:txBody>
+          <a:bodyPr/>
+          <a:lstStyle/>
+          <a:p>
+            <a:r>
+              <a:rPr lang="en-US" sz="3600" dirty="0" smtClean="0"/>
+              <a:t>Educational and Outreach Status</a:t>
+            </a:r>
+            <a:endParaRPr lang="en-US" sz="3600" dirty="0"/>
+          </a:p>
+        </p:txBody>
+      </p:sp>
+      <p:sp>
+        <p:nvSpPr>
+          <p:cNvPr id="3" name="Content Placeholder 2"/>
+          <p:cNvSpPr>
+            <a:spLocks noGrp="1"/>
+          </p:cNvSpPr>
+          <p:nvPr>
+            <p:ph idx="1"/>
+          </p:nvPr>
+        </p:nvSpPr>
+        <p:spPr>
+          <a:xfrm>
+            <a:off x="457200" y="1305116"/>
+            <a:ext cx="8229600" cy="5245410"/>
+          </a:xfrm>
+        </p:spPr>
+        <p:txBody>
+          <a:bodyPr/>
+          <a:lstStyle/>
+          <a:p>
+            <a:r>
+              <a:rPr lang="en-US" sz="1400" dirty="0"/>
+              <a:t>Presented </a:t>
+            </a:r>
+            <a:r>
+              <a:rPr lang="en-US" sz="1400" dirty="0" smtClean="0"/>
+              <a:t>the planned work and current work status of this </a:t>
+            </a:r>
+            <a:r>
+              <a:rPr lang="en-US" sz="1400" dirty="0"/>
+              <a:t>CMAC project </a:t>
+            </a:r>
+            <a:r>
+              <a:rPr lang="en-US" sz="1400" dirty="0" smtClean="0"/>
+              <a:t>at </a:t>
+            </a:r>
+            <a:r>
+              <a:rPr lang="en-US" sz="1400" dirty="0"/>
+              <a:t>2012 AGU Fall meeting in San Francisco, CA, December 2012. </a:t>
+            </a:r>
+          </a:p>
+          <a:p>
+            <a:endParaRPr lang="en-US" sz="1400" dirty="0" smtClean="0"/>
+          </a:p>
+          <a:p>
+            <a:endParaRPr lang="en-US" sz="1400" dirty="0" smtClean="0"/>
+          </a:p>
+          <a:p>
+            <a:pPr marL="0" indent="0">
+              <a:buNone/>
+            </a:pPr>
+            <a:endParaRPr lang="en-US" sz="1400" dirty="0"/>
+          </a:p>
+          <a:p>
+            <a:pPr marL="0" indent="0">
+              <a:buNone/>
+            </a:pPr>
+            <a:endParaRPr lang="en-US" sz="1400" dirty="0"/>
+          </a:p>
+          <a:p>
+            <a:endParaRPr lang="en-US" sz="1400" dirty="0" smtClean="0"/>
+          </a:p>
+          <a:p>
+            <a:endParaRPr lang="en-US" sz="1400" dirty="0"/>
+          </a:p>
+          <a:p>
+            <a:endParaRPr lang="en-US" sz="1400" dirty="0" smtClean="0"/>
+          </a:p>
+          <a:p>
+            <a:endParaRPr lang="en-US" sz="1400" dirty="0" smtClean="0"/>
+          </a:p>
+          <a:p>
+            <a:pPr marL="0" indent="0">
+              <a:buNone/>
+            </a:pPr>
+            <a:endParaRPr lang="en-US" sz="1400" dirty="0"/>
+          </a:p>
+          <a:p>
+            <a:r>
+              <a:rPr lang="en-US" sz="1400" dirty="0" smtClean="0"/>
+              <a:t>This CMAC project agreed to work with CCS and make a demonstration of the tool in April, 2013. Upon a positive response, the tool will be used as an educational tool for the summer school. </a:t>
+            </a:r>
+          </a:p>
+          <a:p>
+            <a:r>
+              <a:rPr lang="en-US" sz="1400" dirty="0" smtClean="0"/>
+              <a:t>Design and requirements for the education tool have been developed: the user interface should be web-browser based; the web server should support &gt;30 simultaneous web-service requests.</a:t>
+            </a:r>
+          </a:p>
+          <a:p>
+            <a:r>
+              <a:rPr lang="en-US" sz="1400" dirty="0" smtClean="0"/>
+              <a:t>Several web-services to support model-data </a:t>
+            </a:r>
+            <a:r>
+              <a:rPr lang="en-US" sz="1400" dirty="0" err="1" smtClean="0"/>
+              <a:t>intercomparisons</a:t>
+            </a:r>
+            <a:r>
+              <a:rPr lang="en-US" sz="1400" dirty="0"/>
+              <a:t> </a:t>
+            </a:r>
+            <a:r>
+              <a:rPr lang="en-US" sz="1400" dirty="0" smtClean="0"/>
+              <a:t>are being developed: analysis and visualization of 2D/3D variable multi-annual means using Coupled Model </a:t>
+            </a:r>
+            <a:r>
+              <a:rPr lang="en-US" sz="1400" dirty="0" err="1" smtClean="0"/>
+              <a:t>Intercomparison</a:t>
+            </a:r>
+            <a:r>
+              <a:rPr lang="en-US" sz="1400" dirty="0" smtClean="0"/>
+              <a:t> Project Phase 5 (CMIP5) model outputs and Obs4MIPs datasets. </a:t>
+            </a:r>
+          </a:p>
+        </p:txBody>
+      </p:sp>
+      <p:sp>
+        <p:nvSpPr>
+          <p:cNvPr id="4" name="Slide Number Placeholder 3"/>
+          <p:cNvSpPr>
+            <a:spLocks noGrp="1"/>
+          </p:cNvSpPr>
+          <p:nvPr>
+            <p:ph type="sldNum" sz="quarter" idx="12"/>
+          </p:nvPr>
+        </p:nvSpPr>
+        <p:spPr/>
+        <p:txBody>
+          <a:bodyPr/>
+          <a:lstStyle/>
+          <a:p>
+            <a:pPr>
+              <a:defRPr/>
+            </a:pPr>
+            <a:fld id="{11C29698-AE0C-CC43-ACA3-6C4B510D6C4C}" type="slidenum">
+              <a:rPr lang="en-US" smtClean="0"/>
+              <a:pPr>
+                <a:defRPr/>
+              </a:pPr>
+              <a:t>12</a:t>
             </a:fld>
             <a:endParaRPr lang="en-US"/>
           </a:p>
@@ -5080,335 +5451,6 @@
 </p:sld>
 </file>
 
-<file path=ppt/slides/slide12.xml><?xml version="1.0" encoding="utf-8"?>
-<p:sld xmlns:a="http://schemas.openxmlformats.org/drawingml/2006/main" xmlns:r="http://schemas.openxmlformats.org/officeDocument/2006/relationships" xmlns:p="http://schemas.openxmlformats.org/presentationml/2006/main">
-  <p:cSld>
-    <p:spTree>
-      <p:nvGrpSpPr>
-        <p:cNvPr id="1" name=""/>
-        <p:cNvGrpSpPr/>
-        <p:nvPr/>
-      </p:nvGrpSpPr>
-      <p:grpSpPr>
-        <a:xfrm>
-          <a:off x="0" y="0"/>
-          <a:ext cx="0" cy="0"/>
-          <a:chOff x="0" y="0"/>
-          <a:chExt cx="0" cy="0"/>
-        </a:xfrm>
-      </p:grpSpPr>
-      <p:sp>
-        <p:nvSpPr>
-          <p:cNvPr id="2" name="Title 1"/>
-          <p:cNvSpPr>
-            <a:spLocks noGrp="1"/>
-          </p:cNvSpPr>
-          <p:nvPr>
-            <p:ph type="title"/>
-          </p:nvPr>
-        </p:nvSpPr>
-        <p:spPr>
-          <a:xfrm>
-            <a:off x="112449" y="274638"/>
-            <a:ext cx="8969537" cy="1143000"/>
-          </a:xfrm>
-        </p:spPr>
-        <p:txBody>
-          <a:bodyPr/>
-          <a:lstStyle/>
-          <a:p>
-            <a:r>
-              <a:rPr lang="en-US" sz="3600" dirty="0" smtClean="0"/>
-              <a:t>CCS Summer School Tool &amp; Curriculum</a:t>
-            </a:r>
-            <a:endParaRPr lang="en-US" sz="3600" dirty="0"/>
-          </a:p>
-        </p:txBody>
-      </p:sp>
-      <p:sp>
-        <p:nvSpPr>
-          <p:cNvPr id="3" name="Content Placeholder 2"/>
-          <p:cNvSpPr>
-            <a:spLocks noGrp="1"/>
-          </p:cNvSpPr>
-          <p:nvPr>
-            <p:ph idx="1"/>
-          </p:nvPr>
-        </p:nvSpPr>
-        <p:spPr>
-          <a:xfrm>
-            <a:off x="457200" y="1305116"/>
-            <a:ext cx="8229600" cy="5245410"/>
-          </a:xfrm>
-        </p:spPr>
-        <p:txBody>
-          <a:bodyPr/>
-          <a:lstStyle/>
-          <a:p>
-            <a:r>
-              <a:rPr lang="en-US" sz="1400" dirty="0" smtClean="0"/>
-              <a:t>The CCS summer school education tool will be a web-browser based tool.</a:t>
-            </a:r>
-          </a:p>
-          <a:p>
-            <a:r>
-              <a:rPr lang="en-US" sz="1400" dirty="0" smtClean="0"/>
-              <a:t>The tool will support the following functionalities: </a:t>
-            </a:r>
-          </a:p>
-          <a:p>
-            <a:pPr lvl="1"/>
-            <a:r>
-              <a:rPr lang="en-US" sz="1200" dirty="0" smtClean="0"/>
-              <a:t>2D variable map of annual means with spatial and temporal selection</a:t>
-            </a:r>
-          </a:p>
-          <a:p>
-            <a:pPr lvl="1"/>
-            <a:r>
-              <a:rPr lang="en-US" sz="1200" dirty="0" smtClean="0"/>
-              <a:t>2D variable zonal means with temporal selection</a:t>
-            </a:r>
-          </a:p>
-          <a:p>
-            <a:pPr lvl="1"/>
-            <a:r>
-              <a:rPr lang="en-US" sz="1200" dirty="0" smtClean="0"/>
-              <a:t>2D variable time series with spatial and temporal selection</a:t>
-            </a:r>
-          </a:p>
-          <a:p>
-            <a:pPr lvl="1"/>
-            <a:r>
-              <a:rPr lang="en-US" sz="1200" dirty="0" smtClean="0"/>
-              <a:t>3D variable vertical profile with spatial and temporal selection</a:t>
-            </a:r>
-          </a:p>
-          <a:p>
-            <a:pPr lvl="1"/>
-            <a:r>
-              <a:rPr lang="en-US" sz="1200" dirty="0" smtClean="0"/>
-              <a:t>3D variable zonal mean profiles with temporal selection</a:t>
-            </a:r>
-          </a:p>
-          <a:p>
-            <a:pPr lvl="1"/>
-            <a:r>
-              <a:rPr lang="en-US" sz="1200" dirty="0" smtClean="0"/>
-              <a:t>3D variable slice map with spatial, temporal and vertical level selection</a:t>
-            </a:r>
-            <a:endParaRPr lang="en-US" sz="1200" dirty="0"/>
-          </a:p>
-          <a:p>
-            <a:pPr marL="0" indent="0">
-              <a:buNone/>
-            </a:pPr>
-            <a:endParaRPr lang="en-US" sz="1200" dirty="0"/>
-          </a:p>
-          <a:p>
-            <a:r>
-              <a:rPr lang="en-US" sz="1400" dirty="0" smtClean="0"/>
-              <a:t>The tool will be used to support the following curriculum: </a:t>
-            </a:r>
-          </a:p>
-          <a:p>
-            <a:pPr lvl="1"/>
-            <a:r>
-              <a:rPr lang="en-US" sz="1200" dirty="0" smtClean="0"/>
-              <a:t>Jonathan: </a:t>
-            </a:r>
-            <a:r>
-              <a:rPr lang="en-US" sz="1200" dirty="0"/>
-              <a:t>D</a:t>
-            </a:r>
-            <a:r>
-              <a:rPr lang="en-US" sz="1200" dirty="0" smtClean="0"/>
-              <a:t>etails about the curriculum please ….</a:t>
-            </a:r>
-          </a:p>
-          <a:p>
-            <a:pPr marL="0" indent="0">
-              <a:buNone/>
-            </a:pPr>
-            <a:endParaRPr lang="en-US" sz="1400" dirty="0" smtClean="0"/>
-          </a:p>
-          <a:p>
-            <a:pPr marL="0" indent="0">
-              <a:buNone/>
-            </a:pPr>
-            <a:endParaRPr lang="en-US" sz="1400" dirty="0"/>
-          </a:p>
-          <a:p>
-            <a:pPr marL="0" indent="0">
-              <a:buNone/>
-            </a:pPr>
-            <a:endParaRPr lang="en-US" sz="1400" dirty="0"/>
-          </a:p>
-          <a:p>
-            <a:endParaRPr lang="en-US" sz="1400" dirty="0" smtClean="0"/>
-          </a:p>
-          <a:p>
-            <a:endParaRPr lang="en-US" sz="1400" dirty="0"/>
-          </a:p>
-        </p:txBody>
-      </p:sp>
-      <p:sp>
-        <p:nvSpPr>
-          <p:cNvPr id="4" name="Slide Number Placeholder 3"/>
-          <p:cNvSpPr>
-            <a:spLocks noGrp="1"/>
-          </p:cNvSpPr>
-          <p:nvPr>
-            <p:ph type="sldNum" sz="quarter" idx="12"/>
-          </p:nvPr>
-        </p:nvSpPr>
-        <p:spPr/>
-        <p:txBody>
-          <a:bodyPr/>
-          <a:lstStyle/>
-          <a:p>
-            <a:pPr>
-              <a:defRPr/>
-            </a:pPr>
-            <a:fld id="{11C29698-AE0C-CC43-ACA3-6C4B510D6C4C}" type="slidenum">
-              <a:rPr lang="en-US" smtClean="0"/>
-              <a:pPr>
-                <a:defRPr/>
-              </a:pPr>
-              <a:t>11</a:t>
-            </a:fld>
-            <a:endParaRPr lang="en-US"/>
-          </a:p>
-        </p:txBody>
-      </p:sp>
-    </p:spTree>
-    <p:extLst>
-      <p:ext uri="{BB962C8B-B14F-4D97-AF65-F5344CB8AC3E}">
-        <p14:creationId xmlns:p14="http://schemas.microsoft.com/office/powerpoint/2010/main" val="805308353"/>
-      </p:ext>
-    </p:extLst>
-  </p:cSld>
-  <p:clrMapOvr>
-    <a:masterClrMapping/>
-  </p:clrMapOvr>
-  <p:timing>
-    <p:tnLst>
-      <p:par>
-        <p:cTn xmlns:p14="http://schemas.microsoft.com/office/powerpoint/2010/main" id="1" dur="indefinite" restart="never" nodeType="tmRoot"/>
-      </p:par>
-    </p:tnLst>
-  </p:timing>
-</p:sld>
-</file>
-
-<file path=ppt/slides/slide13.xml><?xml version="1.0" encoding="utf-8"?>
-<p:sld xmlns:a="http://schemas.openxmlformats.org/drawingml/2006/main" xmlns:r="http://schemas.openxmlformats.org/officeDocument/2006/relationships" xmlns:p="http://schemas.openxmlformats.org/presentationml/2006/main">
-  <p:cSld>
-    <p:spTree>
-      <p:nvGrpSpPr>
-        <p:cNvPr id="1" name=""/>
-        <p:cNvGrpSpPr/>
-        <p:nvPr/>
-      </p:nvGrpSpPr>
-      <p:grpSpPr>
-        <a:xfrm>
-          <a:off x="0" y="0"/>
-          <a:ext cx="0" cy="0"/>
-          <a:chOff x="0" y="0"/>
-          <a:chExt cx="0" cy="0"/>
-        </a:xfrm>
-      </p:grpSpPr>
-      <p:sp>
-        <p:nvSpPr>
-          <p:cNvPr id="2" name="Title 1"/>
-          <p:cNvSpPr>
-            <a:spLocks noGrp="1"/>
-          </p:cNvSpPr>
-          <p:nvPr>
-            <p:ph type="title"/>
-          </p:nvPr>
-        </p:nvSpPr>
-        <p:spPr/>
-        <p:txBody>
-          <a:bodyPr/>
-          <a:lstStyle/>
-          <a:p>
-            <a:r>
-              <a:rPr lang="en-US" dirty="0" smtClean="0"/>
-              <a:t>Primary Findings</a:t>
-            </a:r>
-            <a:endParaRPr lang="en-US" dirty="0"/>
-          </a:p>
-        </p:txBody>
-      </p:sp>
-      <p:sp>
-        <p:nvSpPr>
-          <p:cNvPr id="3" name="Content Placeholder 2"/>
-          <p:cNvSpPr>
-            <a:spLocks noGrp="1"/>
-          </p:cNvSpPr>
-          <p:nvPr>
-            <p:ph idx="1"/>
-          </p:nvPr>
-        </p:nvSpPr>
-        <p:spPr/>
-        <p:txBody>
-          <a:bodyPr/>
-          <a:lstStyle/>
-          <a:p>
-            <a:endParaRPr lang="en-US"/>
-          </a:p>
-        </p:txBody>
-      </p:sp>
-      <p:sp>
-        <p:nvSpPr>
-          <p:cNvPr id="4" name="Slide Number Placeholder 3"/>
-          <p:cNvSpPr>
-            <a:spLocks noGrp="1"/>
-          </p:cNvSpPr>
-          <p:nvPr>
-            <p:ph type="sldNum" sz="quarter" idx="12"/>
-          </p:nvPr>
-        </p:nvSpPr>
-        <p:spPr/>
-        <p:txBody>
-          <a:bodyPr/>
-          <a:lstStyle/>
-          <a:p>
-            <a:pPr>
-              <a:defRPr/>
-            </a:pPr>
-            <a:fld id="{11C29698-AE0C-CC43-ACA3-6C4B510D6C4C}" type="slidenum">
-              <a:rPr lang="en-US" smtClean="0"/>
-              <a:pPr>
-                <a:defRPr/>
-              </a:pPr>
-              <a:t>12</a:t>
-            </a:fld>
-            <a:endParaRPr lang="en-US"/>
-          </a:p>
-        </p:txBody>
-      </p:sp>
-    </p:spTree>
-    <p:extLst>
-      <p:ext uri="{BB962C8B-B14F-4D97-AF65-F5344CB8AC3E}">
-        <p14:creationId xmlns:p14="http://schemas.microsoft.com/office/powerpoint/2010/main" val="3192969668"/>
-      </p:ext>
-    </p:extLst>
-  </p:cSld>
-  <p:clrMapOvr>
-    <a:masterClrMapping/>
-  </p:clrMapOvr>
-  <p:timing>
-    <p:tnLst>
-      <p:par>
-        <p:cTn xmlns:p14="http://schemas.microsoft.com/office/powerpoint/2010/main" id="1" dur="indefinite" restart="never" nodeType="tmRoot"/>
-      </p:par>
-    </p:tnLst>
-  </p:timing>
-</p:sld>
-</file>
-
 <file path=ppt/slides/slide14.xml><?xml version="1.0" encoding="utf-8"?>
 <p:sld xmlns:a="http://schemas.openxmlformats.org/drawingml/2006/main" xmlns:r="http://schemas.openxmlformats.org/officeDocument/2006/relationships" xmlns:p="http://schemas.openxmlformats.org/presentationml/2006/main">
   <p:cSld>
@@ -5436,16 +5478,21 @@
             <p:ph type="title"/>
           </p:nvPr>
         </p:nvSpPr>
-        <p:spPr/>
+        <p:spPr>
+          <a:xfrm>
+            <a:off x="112449" y="274638"/>
+            <a:ext cx="8969537" cy="1143000"/>
+          </a:xfrm>
+        </p:spPr>
         <p:txBody>
           <a:bodyPr/>
           <a:lstStyle/>
           <a:p>
             <a:r>
-              <a:rPr lang="en-US" dirty="0" smtClean="0"/>
-              <a:t>Future Work</a:t>
-            </a:r>
-            <a:endParaRPr lang="en-US" dirty="0"/>
+              <a:rPr lang="en-US" sz="3600" dirty="0" smtClean="0"/>
+              <a:t>CCS Summer School Tool &amp; Curriculum</a:t>
+            </a:r>
+            <a:endParaRPr lang="en-US" sz="3600" dirty="0"/>
           </a:p>
         </p:txBody>
       </p:sp>
@@ -5459,18 +5506,120 @@
             <p:ph idx="1"/>
           </p:nvPr>
         </p:nvSpPr>
-        <p:spPr/>
+        <p:spPr>
+          <a:xfrm>
+            <a:off x="457200" y="1305116"/>
+            <a:ext cx="8229600" cy="5245410"/>
+          </a:xfrm>
+        </p:spPr>
         <p:txBody>
           <a:bodyPr/>
           <a:lstStyle/>
           <a:p>
             <a:r>
-              <a:rPr lang="en-US" sz="2000" dirty="0"/>
-              <a:t>Describe the work planned for the remainder of the project and critical issues that need to be resolved to successfully complete the remaining planned work.</a:t>
-            </a:r>
-          </a:p>
-          <a:p>
-            <a:endParaRPr lang="en-US" sz="2000" dirty="0"/>
+              <a:rPr lang="en-US" sz="1400" dirty="0" smtClean="0"/>
+              <a:t>The CCS summer school education tool will be a web-browser based tool.</a:t>
+            </a:r>
+          </a:p>
+          <a:p>
+            <a:r>
+              <a:rPr lang="en-US" sz="1400" dirty="0" smtClean="0"/>
+              <a:t>The tool will support the following functionalities: </a:t>
+            </a:r>
+          </a:p>
+          <a:p>
+            <a:pPr lvl="1"/>
+            <a:r>
+              <a:rPr lang="en-US" sz="1200" dirty="0" smtClean="0"/>
+              <a:t>2D variable map of annual means with spatial and temporal selection</a:t>
+            </a:r>
+          </a:p>
+          <a:p>
+            <a:pPr lvl="1"/>
+            <a:r>
+              <a:rPr lang="en-US" sz="1200" dirty="0" smtClean="0"/>
+              <a:t>2D variable zonal means with temporal selection</a:t>
+            </a:r>
+          </a:p>
+          <a:p>
+            <a:pPr lvl="1"/>
+            <a:r>
+              <a:rPr lang="en-US" sz="1200" dirty="0" smtClean="0"/>
+              <a:t>2D variable time series with spatial and temporal selection</a:t>
+            </a:r>
+          </a:p>
+          <a:p>
+            <a:pPr lvl="1"/>
+            <a:r>
+              <a:rPr lang="en-US" sz="1200" dirty="0" smtClean="0"/>
+              <a:t>3D variable vertical profile with spatial and temporal selection</a:t>
+            </a:r>
+          </a:p>
+          <a:p>
+            <a:pPr lvl="1"/>
+            <a:r>
+              <a:rPr lang="en-US" sz="1200" dirty="0" smtClean="0"/>
+              <a:t>3D variable zonal mean profiles with temporal selection</a:t>
+            </a:r>
+          </a:p>
+          <a:p>
+            <a:pPr lvl="1"/>
+            <a:r>
+              <a:rPr lang="en-US" sz="1200" dirty="0" smtClean="0"/>
+              <a:t>3D variable slice map with spatial, temporal and vertical level selection</a:t>
+            </a:r>
+            <a:endParaRPr lang="en-US" sz="1200" dirty="0"/>
+          </a:p>
+          <a:p>
+            <a:pPr marL="0" indent="0">
+              <a:buNone/>
+            </a:pPr>
+            <a:endParaRPr lang="en-US" sz="1200" dirty="0"/>
+          </a:p>
+          <a:p>
+            <a:r>
+              <a:rPr lang="en-US" sz="1400" dirty="0" smtClean="0"/>
+              <a:t>The tool will be used to support the following curriculum: </a:t>
+            </a:r>
+          </a:p>
+          <a:p>
+            <a:pPr lvl="1"/>
+            <a:r>
+              <a:rPr lang="en-US" sz="1200" dirty="0" smtClean="0"/>
+              <a:t>Jonathan: </a:t>
+            </a:r>
+            <a:r>
+              <a:rPr lang="en-US" sz="1200" dirty="0"/>
+              <a:t>D</a:t>
+            </a:r>
+            <a:r>
+              <a:rPr lang="en-US" sz="1200" dirty="0" smtClean="0"/>
+              <a:t>etails about the curriculum please ….</a:t>
+            </a:r>
+          </a:p>
+          <a:p>
+            <a:pPr marL="0" indent="0">
+              <a:buNone/>
+            </a:pPr>
+            <a:endParaRPr lang="en-US" sz="1400" dirty="0" smtClean="0"/>
+          </a:p>
+          <a:p>
+            <a:pPr marL="0" indent="0">
+              <a:buNone/>
+            </a:pPr>
+            <a:endParaRPr lang="en-US" sz="1400" dirty="0"/>
+          </a:p>
+          <a:p>
+            <a:pPr marL="0" indent="0">
+              <a:buNone/>
+            </a:pPr>
+            <a:endParaRPr lang="en-US" sz="1400" dirty="0"/>
+          </a:p>
+          <a:p>
+            <a:endParaRPr lang="en-US" sz="1400" dirty="0" smtClean="0"/>
+          </a:p>
+          <a:p>
+            <a:endParaRPr lang="en-US" sz="1400" dirty="0"/>
           </a:p>
         </p:txBody>
       </p:sp>
@@ -5506,7 +5655,7 @@
     </p:spTree>
     <p:extLst>
       <p:ext uri="{BB962C8B-B14F-4D97-AF65-F5344CB8AC3E}">
-        <p14:creationId xmlns:p14="http://schemas.microsoft.com/office/powerpoint/2010/main" val="3495578775"/>
+        <p14:creationId xmlns:p14="http://schemas.microsoft.com/office/powerpoint/2010/main" val="805308353"/>
       </p:ext>
     </p:extLst>
   </p:cSld>
@@ -5557,7 +5706,7 @@
           <a:p>
             <a:r>
               <a:rPr lang="en-US" dirty="0" smtClean="0"/>
-              <a:t>Acronym List</a:t>
+              <a:t>Primary Findings</a:t>
             </a:r>
             <a:endParaRPr lang="en-US" dirty="0"/>
           </a:p>
@@ -5578,86 +5727,7 @@
           <a:bodyPr/>
           <a:lstStyle/>
           <a:p>
-            <a:r>
-              <a:rPr lang="en-US" sz="1200" dirty="0"/>
-              <a:t>PAWS-</a:t>
-            </a:r>
-            <a:r>
-              <a:rPr lang="en-US" sz="1200" dirty="0" smtClean="0"/>
-              <a:t>CMDA: Parallel </a:t>
-            </a:r>
-            <a:r>
-              <a:rPr lang="en-US" sz="1200" dirty="0"/>
-              <a:t>Web-Service </a:t>
-            </a:r>
-            <a:r>
-              <a:rPr lang="en-US" sz="1200" dirty="0" smtClean="0"/>
-              <a:t>Climate </a:t>
-            </a:r>
-            <a:r>
-              <a:rPr lang="en-US" sz="1200" dirty="0"/>
-              <a:t>Model Diagnostic </a:t>
-            </a:r>
-            <a:r>
-              <a:rPr lang="en-US" sz="1200" dirty="0" smtClean="0"/>
-              <a:t>Analyzer</a:t>
-            </a:r>
-          </a:p>
-          <a:p>
-            <a:r>
-              <a:rPr lang="en-US" sz="1200" dirty="0" smtClean="0"/>
-              <a:t>CCS: The </a:t>
-            </a:r>
-            <a:r>
-              <a:rPr lang="en-US" sz="1200" dirty="0"/>
-              <a:t>Center for Climate Sciences </a:t>
-            </a:r>
-            <a:r>
-              <a:rPr lang="en-US" sz="1200" dirty="0" smtClean="0"/>
-              <a:t>in JPL</a:t>
-            </a:r>
-          </a:p>
-          <a:p>
-            <a:r>
-              <a:rPr lang="en-US" sz="1200" dirty="0" smtClean="0"/>
-              <a:t>CMIP5: Coupled </a:t>
-            </a:r>
-            <a:r>
-              <a:rPr lang="en-US" sz="1200" dirty="0"/>
-              <a:t>Model </a:t>
-            </a:r>
-            <a:r>
-              <a:rPr lang="en-US" sz="1200" dirty="0" err="1"/>
-              <a:t>Intercomparison</a:t>
-            </a:r>
-            <a:r>
-              <a:rPr lang="en-US" sz="1200" dirty="0"/>
-              <a:t> Project Phase </a:t>
-            </a:r>
-            <a:r>
-              <a:rPr lang="en-US" sz="1200" dirty="0" smtClean="0"/>
-              <a:t>5</a:t>
-            </a:r>
-          </a:p>
-          <a:p>
-            <a:r>
-              <a:rPr lang="en-US" sz="1200" dirty="0" smtClean="0"/>
-              <a:t>Obs4MIPs: A pilot activity to make observational data products more accessible for climate model </a:t>
-            </a:r>
-            <a:r>
-              <a:rPr lang="en-US" sz="1200" dirty="0" err="1" smtClean="0"/>
-              <a:t>intercomparisons</a:t>
-            </a:r>
-            <a:endParaRPr lang="en-US" sz="1200" dirty="0"/>
-          </a:p>
-          <a:p>
-            <a:endParaRPr lang="en-US" sz="1200" dirty="0"/>
-          </a:p>
-          <a:p>
-            <a:endParaRPr lang="en-US" dirty="0"/>
-          </a:p>
-          <a:p>
-            <a:endParaRPr lang="en-US" dirty="0"/>
+            <a:endParaRPr lang="en-US"/>
           </a:p>
         </p:txBody>
       </p:sp>
@@ -5693,7 +5763,7 @@
     </p:spTree>
     <p:extLst>
       <p:ext uri="{BB962C8B-B14F-4D97-AF65-F5344CB8AC3E}">
-        <p14:creationId xmlns:p14="http://schemas.microsoft.com/office/powerpoint/2010/main" val="998014952"/>
+        <p14:creationId xmlns:p14="http://schemas.microsoft.com/office/powerpoint/2010/main" val="3192969668"/>
       </p:ext>
     </p:extLst>
   </p:cSld>
@@ -5744,7 +5814,7 @@
           <a:p>
             <a:r>
               <a:rPr lang="en-US" dirty="0" smtClean="0"/>
-              <a:t>Backup Slides</a:t>
+              <a:t>Future Work</a:t>
             </a:r>
             <a:endParaRPr lang="en-US" dirty="0"/>
           </a:p>
@@ -5765,7 +5835,13 @@
           <a:bodyPr/>
           <a:lstStyle/>
           <a:p>
-            <a:endParaRPr lang="en-US" dirty="0"/>
+            <a:r>
+              <a:rPr lang="en-US" sz="2000" dirty="0"/>
+              <a:t>Describe the work planned for the remainder of the project and critical issues that need to be resolved to successfully complete the remaining planned work.</a:t>
+            </a:r>
+          </a:p>
+          <a:p>
+            <a:endParaRPr lang="en-US" sz="2000" dirty="0"/>
           </a:p>
         </p:txBody>
       </p:sp>
@@ -5801,13 +5877,20 @@
     </p:spTree>
     <p:extLst>
       <p:ext uri="{BB962C8B-B14F-4D97-AF65-F5344CB8AC3E}">
-        <p14:creationId xmlns:p14="http://schemas.microsoft.com/office/powerpoint/2010/main" val="4280488199"/>
+        <p14:creationId xmlns:p14="http://schemas.microsoft.com/office/powerpoint/2010/main" val="3495578775"/>
       </p:ext>
     </p:extLst>
   </p:cSld>
   <p:clrMapOvr>
     <a:masterClrMapping/>
   </p:clrMapOvr>
+  <p:timing>
+    <p:tnLst>
+      <p:par>
+        <p:cTn xmlns:p14="http://schemas.microsoft.com/office/powerpoint/2010/main" id="1" dur="indefinite" restart="never" nodeType="tmRoot"/>
+      </p:par>
+    </p:tnLst>
+  </p:timing>
 </p:sld>
 </file>
 
@@ -5845,7 +5928,7 @@
           <a:p>
             <a:r>
               <a:rPr lang="en-US" dirty="0" smtClean="0"/>
-              <a:t>Content Guide</a:t>
+              <a:t>Acronym List</a:t>
             </a:r>
             <a:endParaRPr lang="en-US" dirty="0"/>
           </a:p>
@@ -5867,55 +5950,85 @@
           <a:lstStyle/>
           <a:p>
             <a:r>
-              <a:rPr lang="en-US" sz="1000" dirty="0" smtClean="0"/>
-              <a:t>Include a cover page, quad chart, technical information and achievements, a list of technical publications, programmatic (including a milestone schedule and actual vs. planned costs since project inception), student pictures and involvement (including the degree they are pursuing), if applicable, and an acronym list. Acronyms should be spelled out the first time they are used. Each slide should stand on its own and contain sufficient explanation to enable future reviewers of the presentation to understand the information presented without the benefit of having participated in the review itself.</a:t>
-            </a:r>
-          </a:p>
-          <a:p>
-            <a:r>
-              <a:rPr lang="en-US" sz="1000" dirty="0" smtClean="0"/>
-              <a:t>Describe the primary findings, technology development results, and technical status, e.g., status of elements, construction of breadboards or prototype implementations, results of tests and/or proof-of-concept demonstrations, etc.</a:t>
-            </a:r>
-          </a:p>
-          <a:p>
-            <a:r>
-              <a:rPr lang="en-US" sz="1000" dirty="0" smtClean="0"/>
-              <a:t>Describe the work planned for the remainder of the project and critical issues that need to be resolved to successfully complete the remaining planned work.</a:t>
-            </a:r>
-          </a:p>
-          <a:p>
-            <a:r>
-              <a:rPr lang="en-US" sz="1000" dirty="0" smtClean="0"/>
-              <a:t>Summarize </a:t>
-            </a:r>
-            <a:r>
-              <a:rPr lang="en-US" sz="1000" dirty="0"/>
-              <a:t>the cost and schedule status of the project, including any schedule slippage/acceleration. A schedule milestone chart of all major task activities shall be created and maintained and shown at all reviews. A cost data sheet shall be created and maintained, showing total project costs obligated and </a:t>
-            </a:r>
-            <a:r>
-              <a:rPr lang="en-US" sz="1000" dirty="0" err="1"/>
-              <a:t>costed</a:t>
-            </a:r>
-            <a:r>
-              <a:rPr lang="en-US" sz="1000" dirty="0"/>
-              <a:t>, along with a graphical representation of the project cost run outs.</a:t>
-            </a:r>
-          </a:p>
-          <a:p>
-            <a:r>
-              <a:rPr lang="en-US" sz="1000" dirty="0" smtClean="0"/>
-              <a:t>Report </a:t>
-            </a:r>
-            <a:r>
-              <a:rPr lang="en-US" sz="1000" dirty="0"/>
-              <a:t>any educational and outreach components of the project, e.g., graduate degrees, educational activities; technology infusion or patents applied for or granted; journal or conference publications; presentations at professional conference, seminars and symposia; demonstrations; media exposure; and, other activities that contributed to the overall success of the research project. </a:t>
-            </a:r>
-          </a:p>
-          <a:p>
-            <a:r>
-              <a:rPr lang="en-US" sz="1000" dirty="0"/>
-              <a:t>An assessment of the technology readiness level of the components, sub-systems, and systems of the project.</a:t>
-            </a:r>
+              <a:rPr lang="en-US" sz="1200" dirty="0"/>
+              <a:t>PAWS-</a:t>
+            </a:r>
+            <a:r>
+              <a:rPr lang="en-US" sz="1200" dirty="0" smtClean="0"/>
+              <a:t>CMDA: Parallel </a:t>
+            </a:r>
+            <a:r>
+              <a:rPr lang="en-US" sz="1200" dirty="0"/>
+              <a:t>Web-Service </a:t>
+            </a:r>
+            <a:r>
+              <a:rPr lang="en-US" sz="1200" dirty="0" smtClean="0"/>
+              <a:t>Climate </a:t>
+            </a:r>
+            <a:r>
+              <a:rPr lang="en-US" sz="1200" dirty="0"/>
+              <a:t>Model Diagnostic </a:t>
+            </a:r>
+            <a:r>
+              <a:rPr lang="en-US" sz="1200" dirty="0" smtClean="0"/>
+              <a:t>Analyzer</a:t>
+            </a:r>
+          </a:p>
+          <a:p>
+            <a:r>
+              <a:rPr lang="en-US" sz="1200" dirty="0" smtClean="0"/>
+              <a:t>CCS: The </a:t>
+            </a:r>
+            <a:r>
+              <a:rPr lang="en-US" sz="1200" dirty="0"/>
+              <a:t>Center for Climate Sciences </a:t>
+            </a:r>
+            <a:r>
+              <a:rPr lang="en-US" sz="1200" dirty="0" smtClean="0"/>
+              <a:t>in JPL</a:t>
+            </a:r>
+          </a:p>
+          <a:p>
+            <a:r>
+              <a:rPr lang="en-US" sz="1200" dirty="0" smtClean="0"/>
+              <a:t>CMIP5: Coupled </a:t>
+            </a:r>
+            <a:r>
+              <a:rPr lang="en-US" sz="1200" dirty="0"/>
+              <a:t>Model </a:t>
+            </a:r>
+            <a:r>
+              <a:rPr lang="en-US" sz="1200" dirty="0" err="1"/>
+              <a:t>Intercomparison</a:t>
+            </a:r>
+            <a:r>
+              <a:rPr lang="en-US" sz="1200" dirty="0"/>
+              <a:t> Project Phase </a:t>
+            </a:r>
+            <a:r>
+              <a:rPr lang="en-US" sz="1200" dirty="0" smtClean="0"/>
+              <a:t>5</a:t>
+            </a:r>
+          </a:p>
+          <a:p>
+            <a:r>
+              <a:rPr lang="en-US" sz="1200" dirty="0" smtClean="0"/>
+              <a:t>Obs4MIPs: A pilot activity to make observational data products more accessible for climate model </a:t>
+            </a:r>
+            <a:r>
+              <a:rPr lang="en-US" sz="1200" dirty="0" err="1" smtClean="0"/>
+              <a:t>intercomparisons</a:t>
+            </a:r>
+            <a:endParaRPr lang="en-US" sz="1200" dirty="0"/>
+          </a:p>
+          <a:p>
+            <a:endParaRPr lang="en-US" sz="1200" dirty="0"/>
+          </a:p>
+          <a:p>
+            <a:endParaRPr lang="en-US" dirty="0"/>
+          </a:p>
+          <a:p>
+            <a:endParaRPr lang="en-US" dirty="0"/>
           </a:p>
         </p:txBody>
       </p:sp>
@@ -5943,6 +6056,264 @@
                 <a:defRPr/>
               </a:pPr>
               <a:t>16</a:t>
+            </a:fld>
+            <a:endParaRPr lang="en-US"/>
+          </a:p>
+        </p:txBody>
+      </p:sp>
+    </p:spTree>
+    <p:extLst>
+      <p:ext uri="{BB962C8B-B14F-4D97-AF65-F5344CB8AC3E}">
+        <p14:creationId xmlns:p14="http://schemas.microsoft.com/office/powerpoint/2010/main" val="998014952"/>
+      </p:ext>
+    </p:extLst>
+  </p:cSld>
+  <p:clrMapOvr>
+    <a:masterClrMapping/>
+  </p:clrMapOvr>
+  <p:timing>
+    <p:tnLst>
+      <p:par>
+        <p:cTn xmlns:p14="http://schemas.microsoft.com/office/powerpoint/2010/main" id="1" dur="indefinite" restart="never" nodeType="tmRoot"/>
+      </p:par>
+    </p:tnLst>
+  </p:timing>
+</p:sld>
+</file>
+
+<file path=ppt/slides/slide18.xml><?xml version="1.0" encoding="utf-8"?>
+<p:sld xmlns:a="http://schemas.openxmlformats.org/drawingml/2006/main" xmlns:r="http://schemas.openxmlformats.org/officeDocument/2006/relationships" xmlns:p="http://schemas.openxmlformats.org/presentationml/2006/main">
+  <p:cSld>
+    <p:spTree>
+      <p:nvGrpSpPr>
+        <p:cNvPr id="1" name=""/>
+        <p:cNvGrpSpPr/>
+        <p:nvPr/>
+      </p:nvGrpSpPr>
+      <p:grpSpPr>
+        <a:xfrm>
+          <a:off x="0" y="0"/>
+          <a:ext cx="0" cy="0"/>
+          <a:chOff x="0" y="0"/>
+          <a:chExt cx="0" cy="0"/>
+        </a:xfrm>
+      </p:grpSpPr>
+      <p:sp>
+        <p:nvSpPr>
+          <p:cNvPr id="2" name="Title 1"/>
+          <p:cNvSpPr>
+            <a:spLocks noGrp="1"/>
+          </p:cNvSpPr>
+          <p:nvPr>
+            <p:ph type="title"/>
+          </p:nvPr>
+        </p:nvSpPr>
+        <p:spPr/>
+        <p:txBody>
+          <a:bodyPr/>
+          <a:lstStyle/>
+          <a:p>
+            <a:r>
+              <a:rPr lang="en-US" dirty="0" smtClean="0"/>
+              <a:t>Backup Slides</a:t>
+            </a:r>
+            <a:endParaRPr lang="en-US" dirty="0"/>
+          </a:p>
+        </p:txBody>
+      </p:sp>
+      <p:sp>
+        <p:nvSpPr>
+          <p:cNvPr id="3" name="Content Placeholder 2"/>
+          <p:cNvSpPr>
+            <a:spLocks noGrp="1"/>
+          </p:cNvSpPr>
+          <p:nvPr>
+            <p:ph idx="1"/>
+          </p:nvPr>
+        </p:nvSpPr>
+        <p:spPr/>
+        <p:txBody>
+          <a:bodyPr/>
+          <a:lstStyle/>
+          <a:p>
+            <a:endParaRPr lang="en-US" dirty="0"/>
+          </a:p>
+        </p:txBody>
+      </p:sp>
+      <p:sp>
+        <p:nvSpPr>
+          <p:cNvPr id="4" name="Slide Number Placeholder 3"/>
+          <p:cNvSpPr>
+            <a:spLocks noGrp="1"/>
+          </p:cNvSpPr>
+          <p:nvPr>
+            <p:ph type="sldNum" sz="quarter" idx="12"/>
+          </p:nvPr>
+        </p:nvSpPr>
+        <p:spPr/>
+        <p:txBody>
+          <a:bodyPr/>
+          <a:lstStyle/>
+          <a:p>
+            <a:pPr>
+              <a:defRPr/>
+            </a:pPr>
+            <a:fld id="{11C29698-AE0C-CC43-ACA3-6C4B510D6C4C}" type="slidenum">
+              <a:rPr lang="en-US" smtClean="0"/>
+              <a:pPr>
+                <a:defRPr/>
+              </a:pPr>
+              <a:t>17</a:t>
+            </a:fld>
+            <a:endParaRPr lang="en-US"/>
+          </a:p>
+        </p:txBody>
+      </p:sp>
+    </p:spTree>
+    <p:extLst>
+      <p:ext uri="{BB962C8B-B14F-4D97-AF65-F5344CB8AC3E}">
+        <p14:creationId xmlns:p14="http://schemas.microsoft.com/office/powerpoint/2010/main" val="4280488199"/>
+      </p:ext>
+    </p:extLst>
+  </p:cSld>
+  <p:clrMapOvr>
+    <a:masterClrMapping/>
+  </p:clrMapOvr>
+</p:sld>
+</file>
+
+<file path=ppt/slides/slide19.xml><?xml version="1.0" encoding="utf-8"?>
+<p:sld xmlns:a="http://schemas.openxmlformats.org/drawingml/2006/main" xmlns:r="http://schemas.openxmlformats.org/officeDocument/2006/relationships" xmlns:p="http://schemas.openxmlformats.org/presentationml/2006/main">
+  <p:cSld>
+    <p:spTree>
+      <p:nvGrpSpPr>
+        <p:cNvPr id="1" name=""/>
+        <p:cNvGrpSpPr/>
+        <p:nvPr/>
+      </p:nvGrpSpPr>
+      <p:grpSpPr>
+        <a:xfrm>
+          <a:off x="0" y="0"/>
+          <a:ext cx="0" cy="0"/>
+          <a:chOff x="0" y="0"/>
+          <a:chExt cx="0" cy="0"/>
+        </a:xfrm>
+      </p:grpSpPr>
+      <p:sp>
+        <p:nvSpPr>
+          <p:cNvPr id="2" name="Title 1"/>
+          <p:cNvSpPr>
+            <a:spLocks noGrp="1"/>
+          </p:cNvSpPr>
+          <p:nvPr>
+            <p:ph type="title"/>
+          </p:nvPr>
+        </p:nvSpPr>
+        <p:spPr/>
+        <p:txBody>
+          <a:bodyPr/>
+          <a:lstStyle/>
+          <a:p>
+            <a:r>
+              <a:rPr lang="en-US" dirty="0" smtClean="0"/>
+              <a:t>Content Guide</a:t>
+            </a:r>
+            <a:endParaRPr lang="en-US" dirty="0"/>
+          </a:p>
+        </p:txBody>
+      </p:sp>
+      <p:sp>
+        <p:nvSpPr>
+          <p:cNvPr id="3" name="Content Placeholder 2"/>
+          <p:cNvSpPr>
+            <a:spLocks noGrp="1"/>
+          </p:cNvSpPr>
+          <p:nvPr>
+            <p:ph idx="1"/>
+          </p:nvPr>
+        </p:nvSpPr>
+        <p:spPr/>
+        <p:txBody>
+          <a:bodyPr/>
+          <a:lstStyle/>
+          <a:p>
+            <a:r>
+              <a:rPr lang="en-US" sz="1000" dirty="0" smtClean="0"/>
+              <a:t>Include a cover page, quad chart, technical information and achievements, a list of technical publications, programmatic (including a milestone schedule and actual vs. planned costs since project inception), student pictures and involvement (including the degree they are pursuing), if applicable, and an acronym list. Acronyms should be spelled out the first time they are used. Each slide should stand on its own and contain sufficient explanation to enable future reviewers of the presentation to understand the information presented without the benefit of having participated in the review itself.</a:t>
+            </a:r>
+          </a:p>
+          <a:p>
+            <a:r>
+              <a:rPr lang="en-US" sz="1000" dirty="0" smtClean="0"/>
+              <a:t>Describe the primary findings, technology development results, and technical status, e.g., status of elements, construction of breadboards or prototype implementations, results of tests and/or proof-of-concept demonstrations, etc.</a:t>
+            </a:r>
+          </a:p>
+          <a:p>
+            <a:r>
+              <a:rPr lang="en-US" sz="1000" dirty="0" smtClean="0"/>
+              <a:t>Describe the work planned for the remainder of the project and critical issues that need to be resolved to successfully complete the remaining planned work.</a:t>
+            </a:r>
+          </a:p>
+          <a:p>
+            <a:r>
+              <a:rPr lang="en-US" sz="1000" dirty="0" smtClean="0"/>
+              <a:t>Summarize </a:t>
+            </a:r>
+            <a:r>
+              <a:rPr lang="en-US" sz="1000" dirty="0"/>
+              <a:t>the cost and schedule status of the project, including any schedule slippage/acceleration. A schedule milestone chart of all major task activities shall be created and maintained and shown at all reviews. A cost data sheet shall be created and maintained, showing total project costs obligated and </a:t>
+            </a:r>
+            <a:r>
+              <a:rPr lang="en-US" sz="1000" dirty="0" err="1"/>
+              <a:t>costed</a:t>
+            </a:r>
+            <a:r>
+              <a:rPr lang="en-US" sz="1000" dirty="0"/>
+              <a:t>, along with a graphical representation of the project cost run outs.</a:t>
+            </a:r>
+          </a:p>
+          <a:p>
+            <a:r>
+              <a:rPr lang="en-US" sz="1000" dirty="0" smtClean="0"/>
+              <a:t>Report </a:t>
+            </a:r>
+            <a:r>
+              <a:rPr lang="en-US" sz="1000" dirty="0"/>
+              <a:t>any educational and outreach components of the project, e.g., graduate degrees, educational activities; technology infusion or patents applied for or granted; journal or conference publications; presentations at professional conference, seminars and symposia; demonstrations; media exposure; and, other activities that contributed to the overall success of the research project. </a:t>
+            </a:r>
+          </a:p>
+          <a:p>
+            <a:r>
+              <a:rPr lang="en-US" sz="1000" dirty="0"/>
+              <a:t>An assessment of the technology readiness level of the components, sub-systems, and systems of the project.</a:t>
+            </a:r>
+          </a:p>
+        </p:txBody>
+      </p:sp>
+      <p:sp>
+        <p:nvSpPr>
+          <p:cNvPr id="4" name="Slide Number Placeholder 3"/>
+          <p:cNvSpPr>
+            <a:spLocks noGrp="1"/>
+          </p:cNvSpPr>
+          <p:nvPr>
+            <p:ph type="sldNum" sz="quarter" idx="12"/>
+          </p:nvPr>
+        </p:nvSpPr>
+        <p:spPr/>
+        <p:txBody>
+          <a:bodyPr/>
+          <a:lstStyle/>
+          <a:p>
+            <a:pPr>
+              <a:defRPr/>
+            </a:pPr>
+            <a:fld id="{11C29698-AE0C-CC43-ACA3-6C4B510D6C4C}" type="slidenum">
+              <a:rPr lang="en-US" smtClean="0"/>
+              <a:pPr>
+                <a:defRPr/>
+              </a:pPr>
+              <a:t>18</a:t>
             </a:fld>
             <a:endParaRPr lang="en-US"/>
           </a:p>
@@ -7384,15 +7755,7 @@
           <a:p>
             <a:r>
               <a:rPr lang="en-US" sz="3600" dirty="0" smtClean="0"/>
-              <a:t>Developing Python-</a:t>
-            </a:r>
-            <a:r>
-              <a:rPr lang="en-US" sz="3600" dirty="0" smtClean="0"/>
-              <a:t>Driven </a:t>
-            </a:r>
-            <a:r>
-              <a:rPr lang="en-US" sz="3600" dirty="0" smtClean="0"/>
-              <a:t>System</a:t>
+              <a:t>Developing Python-Driven System</a:t>
             </a:r>
             <a:endParaRPr lang="en-US" sz="3600" dirty="0"/>
           </a:p>
@@ -7613,12 +7976,6 @@
               </a:rPr>
               <a:t>The legacy App. now looks like a python application</a:t>
             </a:r>
-            <a:endParaRPr lang="en-US" sz="2000" dirty="0" smtClean="0">
-              <a:solidFill>
-                <a:srgbClr val="000000"/>
-              </a:solidFill>
-              <a:latin typeface="Comic Sans MS" charset="0"/>
-            </a:endParaRPr>
           </a:p>
         </p:txBody>
       </p:sp>
@@ -7728,8 +8085,8 @@
         </p:nvSpPr>
         <p:spPr>
           <a:xfrm>
-            <a:off x="457200" y="1024222"/>
-            <a:ext cx="8229600" cy="5517127"/>
+            <a:off x="498420" y="1181266"/>
+            <a:ext cx="8229347" cy="4902595"/>
           </a:xfrm>
         </p:spPr>
         <p:txBody>
@@ -7738,31 +8095,11 @@
           <a:p>
             <a:r>
               <a:rPr lang="en-US" sz="2000" dirty="0" smtClean="0"/>
-              <a:t>What does scientists get from our web services?</a:t>
-            </a:r>
-          </a:p>
-          <a:p>
-            <a:pPr lvl="1"/>
-            <a:r>
-              <a:rPr lang="en-US" sz="2000" dirty="0"/>
-              <a:t>M</a:t>
+              <a:t>Use </a:t>
             </a:r>
             <a:r>
               <a:rPr lang="en-US" sz="2000" dirty="0" smtClean="0"/>
-              <a:t>ainly to avoid downloading PBs of satellite data directly</a:t>
-            </a:r>
-          </a:p>
-          <a:p>
-            <a:pPr lvl="1"/>
-            <a:r>
-              <a:rPr lang="en-US" sz="2000" dirty="0" smtClean="0"/>
-              <a:t>Some common pre-processing algorithms</a:t>
-            </a:r>
-          </a:p>
-          <a:p>
-            <a:r>
-              <a:rPr lang="en-US" sz="2000" dirty="0" smtClean="0"/>
-              <a:t>Use Flask, an open source </a:t>
+              <a:t>Flask, an open source </a:t>
             </a:r>
             <a:r>
               <a:rPr lang="en-US" sz="2000" dirty="0" err="1" smtClean="0"/>
@@ -7801,12 +8138,12 @@
               <a:t>Get return values and pass them to client in </a:t>
             </a:r>
             <a:r>
-              <a:rPr lang="en-US" sz="1600" dirty="0" err="1" smtClean="0"/>
-              <a:t>Json</a:t>
-            </a:r>
-            <a:r>
               <a:rPr lang="en-US" sz="1600" dirty="0" smtClean="0"/>
-              <a:t> format</a:t>
+              <a:t>JSON </a:t>
+            </a:r>
+            <a:r>
+              <a:rPr lang="en-US" sz="1600" dirty="0" smtClean="0"/>
+              <a:t>format</a:t>
             </a:r>
           </a:p>
           <a:p>
@@ -7821,11 +8158,7 @@
             </a:r>
             <a:r>
               <a:rPr lang="en-US" sz="1600" dirty="0" smtClean="0"/>
-              <a:t> </a:t>
-            </a:r>
-            <a:r>
-              <a:rPr lang="en-US" sz="1600" dirty="0" smtClean="0"/>
-              <a:t>style: scoping info. placed in URI and method info. conveyed in HTTP method</a:t>
+              <a:t> style: scoping info. placed in URI and method info. conveyed in HTTP method</a:t>
             </a:r>
           </a:p>
           <a:p>
@@ -7862,7 +8195,6 @@
               <a:rPr lang="en-US" sz="1200" dirty="0" smtClean="0"/>
               <a:t>=199001&amp;end_time=199512&amp;lon1=0&amp;lon2=100&amp;lat1=-29&amp;lat2=29&amp;months=1,2,3</a:t>
             </a:r>
-            <a:endParaRPr lang="en-US" sz="1200" dirty="0" smtClean="0"/>
           </a:p>
           <a:p>
             <a:pPr lvl="1"/>
@@ -7894,8 +8226,25 @@
             </a:r>
             <a:r>
               <a:rPr lang="en-US" sz="2000" dirty="0" smtClean="0"/>
-              <a:t> to provide WSGI service (app.)</a:t>
-            </a:r>
+              <a:t> to provide </a:t>
+            </a:r>
+            <a:r>
+              <a:rPr lang="en-US" sz="2000" dirty="0" smtClean="0"/>
+              <a:t>WSGI </a:t>
+            </a:r>
+            <a:r>
+              <a:rPr lang="en-US" sz="1400" dirty="0" smtClean="0"/>
+              <a:t>(Web Service Gateway Interface) </a:t>
+            </a:r>
+            <a:r>
+              <a:rPr lang="en-US" sz="2000" dirty="0" smtClean="0"/>
+              <a:t>service (app.</a:t>
+            </a:r>
+            <a:r>
+              <a:rPr lang="en-US" sz="2000" dirty="0" smtClean="0"/>
+              <a:t>)</a:t>
+            </a:r>
+            <a:endParaRPr lang="en-US" sz="2000" dirty="0" smtClean="0"/>
           </a:p>
           <a:p>
             <a:pPr lvl="1"/>
@@ -7975,6 +8324,49 @@
       </p:grpSpPr>
       <p:sp>
         <p:nvSpPr>
+          <p:cNvPr id="19" name="Rectangle 18"/>
+          <p:cNvSpPr/>
+          <p:nvPr/>
+        </p:nvSpPr>
+        <p:spPr>
+          <a:xfrm>
+            <a:off x="511824" y="2511813"/>
+            <a:ext cx="8118394" cy="617521"/>
+          </a:xfrm>
+          <a:prstGeom prst="rect">
+            <a:avLst/>
+          </a:prstGeom>
+          <a:solidFill>
+            <a:schemeClr val="accent1">
+              <a:alpha val="47000"/>
+            </a:schemeClr>
+          </a:solidFill>
+        </p:spPr>
+        <p:style>
+          <a:lnRef idx="1">
+            <a:schemeClr val="accent1"/>
+          </a:lnRef>
+          <a:fillRef idx="3">
+            <a:schemeClr val="accent1"/>
+          </a:fillRef>
+          <a:effectRef idx="2">
+            <a:schemeClr val="accent1"/>
+          </a:effectRef>
+          <a:fontRef idx="minor">
+            <a:schemeClr val="lt1"/>
+          </a:fontRef>
+        </p:style>
+        <p:txBody>
+          <a:bodyPr rtlCol="0" anchor="ctr"/>
+          <a:lstStyle/>
+          <a:p>
+            <a:pPr algn="ctr"/>
+            <a:endParaRPr lang="en-US"/>
+          </a:p>
+        </p:txBody>
+      </p:sp>
+      <p:sp>
+        <p:nvSpPr>
           <p:cNvPr id="2" name="Title 1"/>
           <p:cNvSpPr>
             <a:spLocks noGrp="1"/>
@@ -7983,109 +8375,21 @@
             <p:ph type="title"/>
           </p:nvPr>
         </p:nvSpPr>
-        <p:spPr/>
+        <p:spPr>
+          <a:xfrm>
+            <a:off x="68277" y="286195"/>
+            <a:ext cx="3399183" cy="572050"/>
+          </a:xfrm>
+        </p:spPr>
         <p:txBody>
           <a:bodyPr/>
           <a:lstStyle/>
           <a:p>
             <a:r>
-              <a:rPr lang="en-US" dirty="0" smtClean="0"/>
-              <a:t>Programmatic Status</a:t>
-            </a:r>
-            <a:endParaRPr lang="en-US" dirty="0"/>
-          </a:p>
-        </p:txBody>
-      </p:sp>
-      <p:sp>
-        <p:nvSpPr>
-          <p:cNvPr id="3" name="Content Placeholder 2"/>
-          <p:cNvSpPr>
-            <a:spLocks noGrp="1"/>
-          </p:cNvSpPr>
-          <p:nvPr>
-            <p:ph idx="1"/>
-          </p:nvPr>
-        </p:nvSpPr>
-        <p:spPr/>
-        <p:txBody>
-          <a:bodyPr/>
-          <a:lstStyle/>
-          <a:p>
-            <a:r>
-              <a:rPr lang="en-US" sz="2000" dirty="0" smtClean="0"/>
-              <a:t>This CMAC project started on October 1</a:t>
-            </a:r>
-            <a:r>
-              <a:rPr lang="en-US" sz="2000" baseline="30000" dirty="0" smtClean="0"/>
-              <a:t>st</a:t>
-            </a:r>
-            <a:r>
-              <a:rPr lang="en-US" sz="2000" dirty="0" smtClean="0"/>
-              <a:t>, 2012.</a:t>
-            </a:r>
-          </a:p>
-          <a:p>
-            <a:r>
-              <a:rPr lang="en-US" sz="2000" dirty="0" smtClean="0"/>
-              <a:t>This project total budget is $616K with $303K for year 1</a:t>
-            </a:r>
-            <a:r>
-              <a:rPr lang="en-US" sz="2000" dirty="0"/>
-              <a:t> </a:t>
-            </a:r>
-            <a:r>
-              <a:rPr lang="en-US" sz="2000" dirty="0" smtClean="0"/>
-              <a:t>and $313K for year 2.</a:t>
-            </a:r>
-          </a:p>
-          <a:p>
-            <a:r>
-              <a:rPr lang="en-US" sz="2000" dirty="0" smtClean="0"/>
-              <a:t>This project has 9 tasks, 5 deliverables, and 3 milestones. </a:t>
-            </a:r>
-          </a:p>
-          <a:p>
-            <a:r>
-              <a:rPr lang="en-US" sz="2000" dirty="0" smtClean="0"/>
-              <a:t>The schedule/order of the tasks is adjusted to improve the development cycle and support the new educational opportunity.</a:t>
-            </a:r>
-          </a:p>
-          <a:p>
-            <a:r>
-              <a:rPr lang="en-US" sz="2000" dirty="0" smtClean="0"/>
-              <a:t>4 tasks are partially completed and 1 task is delayed.</a:t>
-            </a:r>
-          </a:p>
-          <a:p>
-            <a:r>
-              <a:rPr lang="en-US" sz="2000" dirty="0" smtClean="0"/>
-              <a:t>The project cost is overrun by $16K as of the end of February.</a:t>
-            </a:r>
-          </a:p>
-          <a:p>
-            <a:r>
-              <a:rPr lang="en-US" sz="2000" dirty="0" smtClean="0"/>
-              <a:t>The overrun is due to the overrun in hardware purchase and installation. </a:t>
-            </a:r>
-          </a:p>
-          <a:p>
-            <a:r>
-              <a:rPr lang="en-US" sz="2000" dirty="0" smtClean="0"/>
-              <a:t>The overrun will be corrected </a:t>
-            </a:r>
-            <a:r>
-              <a:rPr lang="en-US" sz="2000" dirty="0"/>
-              <a:t>by the gradual reduction of the labor cost through the rest of the year. </a:t>
-            </a:r>
-          </a:p>
-          <a:p>
-            <a:pPr marL="0" indent="0">
-              <a:buNone/>
-            </a:pPr>
-            <a:r>
-              <a:rPr lang="en-US" sz="2000" dirty="0" smtClean="0"/>
-              <a:t>   </a:t>
-            </a:r>
+              <a:rPr lang="en-US" sz="2800" dirty="0" smtClean="0"/>
+              <a:t>Service Diagram</a:t>
+            </a:r>
+            <a:endParaRPr lang="en-US" sz="2800" dirty="0"/>
           </a:p>
         </p:txBody>
       </p:sp>
@@ -8118,23 +8422,679 @@
           </a:p>
         </p:txBody>
       </p:sp>
+      <p:grpSp>
+        <p:nvGrpSpPr>
+          <p:cNvPr id="16" name="Group 15"/>
+          <p:cNvGrpSpPr/>
+          <p:nvPr/>
+        </p:nvGrpSpPr>
+        <p:grpSpPr>
+          <a:xfrm>
+            <a:off x="2922851" y="3316458"/>
+            <a:ext cx="3470180" cy="3477528"/>
+            <a:chOff x="1515749" y="2142040"/>
+            <a:chExt cx="3470180" cy="3581582"/>
+          </a:xfrm>
+        </p:grpSpPr>
+        <p:pic>
+          <p:nvPicPr>
+            <p:cNvPr id="13" name="Picture 12" descr="flask2.jpg"/>
+            <p:cNvPicPr>
+              <a:picLocks noChangeAspect="1"/>
+            </p:cNvPicPr>
+            <p:nvPr/>
+          </p:nvPicPr>
+          <p:blipFill>
+            <a:blip r:embed="rId2">
+              <a:extLst>
+                <a:ext uri="{28A0092B-C50C-407E-A947-70E740481C1C}">
+                  <a14:useLocalDpi xmlns:a14="http://schemas.microsoft.com/office/drawing/2010/main" val="0"/>
+                </a:ext>
+              </a:extLst>
+            </a:blip>
+            <a:stretch>
+              <a:fillRect/>
+            </a:stretch>
+          </p:blipFill>
+          <p:spPr>
+            <a:xfrm>
+              <a:off x="1515749" y="2142040"/>
+              <a:ext cx="3470180" cy="3581582"/>
+            </a:xfrm>
+            <a:prstGeom prst="rect">
+              <a:avLst/>
+            </a:prstGeom>
+          </p:spPr>
+        </p:pic>
+        <p:grpSp>
+          <p:nvGrpSpPr>
+            <p:cNvPr id="11" name="Group 10"/>
+            <p:cNvGrpSpPr/>
+            <p:nvPr/>
+          </p:nvGrpSpPr>
+          <p:grpSpPr>
+            <a:xfrm>
+              <a:off x="2374432" y="4132064"/>
+              <a:ext cx="1659030" cy="1194922"/>
+              <a:chOff x="1854452" y="3912518"/>
+              <a:chExt cx="1659030" cy="1194922"/>
+            </a:xfrm>
+          </p:grpSpPr>
+          <p:sp>
+            <p:nvSpPr>
+              <p:cNvPr id="7" name="Rounded Rectangle 6"/>
+              <p:cNvSpPr/>
+              <p:nvPr/>
+            </p:nvSpPr>
+            <p:spPr>
+              <a:xfrm>
+                <a:off x="1854452" y="3912518"/>
+                <a:ext cx="1604510" cy="1194922"/>
+              </a:xfrm>
+              <a:prstGeom prst="roundRect">
+                <a:avLst/>
+              </a:prstGeom>
+              <a:solidFill>
+                <a:schemeClr val="accent1">
+                  <a:alpha val="41000"/>
+                </a:schemeClr>
+              </a:solidFill>
+            </p:spPr>
+            <p:style>
+              <a:lnRef idx="1">
+                <a:schemeClr val="accent1"/>
+              </a:lnRef>
+              <a:fillRef idx="3">
+                <a:schemeClr val="accent1"/>
+              </a:fillRef>
+              <a:effectRef idx="2">
+                <a:schemeClr val="accent1"/>
+              </a:effectRef>
+              <a:fontRef idx="minor">
+                <a:schemeClr val="lt1"/>
+              </a:fontRef>
+            </p:style>
+            <p:txBody>
+              <a:bodyPr rtlCol="0" anchor="ctr"/>
+              <a:lstStyle/>
+              <a:p>
+                <a:pPr algn="ctr"/>
+                <a:endParaRPr lang="en-US"/>
+              </a:p>
+            </p:txBody>
+          </p:sp>
+          <p:grpSp>
+            <p:nvGrpSpPr>
+              <p:cNvPr id="9" name="Group 8"/>
+              <p:cNvGrpSpPr/>
+              <p:nvPr/>
+            </p:nvGrpSpPr>
+            <p:grpSpPr>
+              <a:xfrm>
+                <a:off x="2225100" y="4410251"/>
+                <a:ext cx="1036831" cy="411123"/>
+                <a:chOff x="2245584" y="4341971"/>
+                <a:chExt cx="1036831" cy="411123"/>
+              </a:xfrm>
+            </p:grpSpPr>
+            <p:pic>
+              <p:nvPicPr>
+                <p:cNvPr id="5" name="Picture 4" descr="octave.png"/>
+                <p:cNvPicPr>
+                  <a:picLocks noChangeAspect="1"/>
+                </p:cNvPicPr>
+                <p:nvPr/>
+              </p:nvPicPr>
+              <p:blipFill>
+                <a:blip r:embed="rId3">
+                  <a:extLst>
+                    <a:ext uri="{28A0092B-C50C-407E-A947-70E740481C1C}">
+                      <a14:useLocalDpi xmlns:a14="http://schemas.microsoft.com/office/drawing/2010/main" val="0"/>
+                    </a:ext>
+                  </a:extLst>
+                </a:blip>
+                <a:stretch>
+                  <a:fillRect/>
+                </a:stretch>
+              </p:blipFill>
+              <p:spPr>
+                <a:xfrm>
+                  <a:off x="2245584" y="4341971"/>
+                  <a:ext cx="411123" cy="411123"/>
+                </a:xfrm>
+                <a:prstGeom prst="rect">
+                  <a:avLst/>
+                </a:prstGeom>
+              </p:spPr>
+            </p:pic>
+            <p:sp>
+              <p:nvSpPr>
+                <p:cNvPr id="6" name="TextBox 5"/>
+                <p:cNvSpPr txBox="1"/>
+                <p:nvPr/>
+              </p:nvSpPr>
+              <p:spPr>
+                <a:xfrm>
+                  <a:off x="2335070" y="4409033"/>
+                  <a:ext cx="947345" cy="276999"/>
+                </a:xfrm>
+                <a:prstGeom prst="rect">
+                  <a:avLst/>
+                </a:prstGeom>
+                <a:noFill/>
+              </p:spPr>
+              <p:txBody>
+                <a:bodyPr wrap="none" rtlCol="0">
+                  <a:spAutoFit/>
+                </a:bodyPr>
+                <a:lstStyle/>
+                <a:p>
+                  <a:r>
+                    <a:rPr lang="en-US" sz="1200" dirty="0" smtClean="0"/>
+                    <a:t>Octave App.</a:t>
+                  </a:r>
+                  <a:endParaRPr lang="en-US" sz="1200" dirty="0"/>
+                </a:p>
+              </p:txBody>
+            </p:sp>
+          </p:grpSp>
+          <p:pic>
+            <p:nvPicPr>
+              <p:cNvPr id="8" name="Picture 7" descr="python-logo-master-v3-trans.png"/>
+              <p:cNvPicPr>
+                <a:picLocks noChangeAspect="1"/>
+              </p:cNvPicPr>
+              <p:nvPr/>
+            </p:nvPicPr>
+            <p:blipFill>
+              <a:blip r:embed="rId4">
+                <a:extLst>
+                  <a:ext uri="{28A0092B-C50C-407E-A947-70E740481C1C}">
+                    <a14:useLocalDpi xmlns:a14="http://schemas.microsoft.com/office/drawing/2010/main" val="0"/>
+                  </a:ext>
+                </a:extLst>
+              </a:blip>
+              <a:stretch>
+                <a:fillRect/>
+              </a:stretch>
+            </p:blipFill>
+            <p:spPr>
+              <a:xfrm>
+                <a:off x="2412615" y="3970129"/>
+                <a:ext cx="1100867" cy="371841"/>
+              </a:xfrm>
+              <a:prstGeom prst="rect">
+                <a:avLst/>
+              </a:prstGeom>
+            </p:spPr>
+          </p:pic>
+        </p:grpSp>
+        <p:pic>
+          <p:nvPicPr>
+            <p:cNvPr id="14" name="Picture 13" descr="flask (1).png"/>
+            <p:cNvPicPr>
+              <a:picLocks noChangeAspect="1"/>
+            </p:cNvPicPr>
+            <p:nvPr/>
+          </p:nvPicPr>
+          <p:blipFill>
+            <a:blip r:embed="rId5">
+              <a:extLst>
+                <a:ext uri="{28A0092B-C50C-407E-A947-70E740481C1C}">
+                  <a14:useLocalDpi xmlns:a14="http://schemas.microsoft.com/office/drawing/2010/main" val="0"/>
+                </a:ext>
+              </a:extLst>
+            </a:blip>
+            <a:stretch>
+              <a:fillRect/>
+            </a:stretch>
+          </p:blipFill>
+          <p:spPr>
+            <a:xfrm>
+              <a:off x="2932595" y="3194024"/>
+              <a:ext cx="536375" cy="672741"/>
+            </a:xfrm>
+            <a:prstGeom prst="rect">
+              <a:avLst/>
+            </a:prstGeom>
+          </p:spPr>
+        </p:pic>
+      </p:grpSp>
+      <p:pic>
+        <p:nvPicPr>
+          <p:cNvPr id="15" name="Picture 14" descr="large_gunicorn.png"/>
+          <p:cNvPicPr>
+            <a:picLocks noChangeAspect="1"/>
+          </p:cNvPicPr>
+          <p:nvPr/>
+        </p:nvPicPr>
+        <p:blipFill>
+          <a:blip r:embed="rId6">
+            <a:extLst>
+              <a:ext uri="{28A0092B-C50C-407E-A947-70E740481C1C}">
+                <a14:useLocalDpi xmlns:a14="http://schemas.microsoft.com/office/drawing/2010/main" val="0"/>
+              </a:ext>
+            </a:extLst>
+          </a:blip>
+          <a:stretch>
+            <a:fillRect/>
+          </a:stretch>
+        </p:blipFill>
+        <p:spPr>
+          <a:xfrm>
+            <a:off x="921742" y="2593750"/>
+            <a:ext cx="3029901" cy="535584"/>
+          </a:xfrm>
+          <a:prstGeom prst="rect">
+            <a:avLst/>
+          </a:prstGeom>
+        </p:spPr>
+      </p:pic>
+      <p:pic>
+        <p:nvPicPr>
+          <p:cNvPr id="17" name="Picture 16" descr="tornado.png"/>
+          <p:cNvPicPr>
+            <a:picLocks noChangeAspect="1"/>
+          </p:cNvPicPr>
+          <p:nvPr/>
+        </p:nvPicPr>
+        <p:blipFill>
+          <a:blip r:embed="rId7">
+            <a:extLst>
+              <a:ext uri="{28A0092B-C50C-407E-A947-70E740481C1C}">
+                <a14:useLocalDpi xmlns:a14="http://schemas.microsoft.com/office/drawing/2010/main" val="0"/>
+              </a:ext>
+            </a:extLst>
+          </a:blip>
+          <a:stretch>
+            <a:fillRect/>
+          </a:stretch>
+        </p:blipFill>
+        <p:spPr>
+          <a:xfrm>
+            <a:off x="5987894" y="2511814"/>
+            <a:ext cx="2376904" cy="535584"/>
+          </a:xfrm>
+          <a:prstGeom prst="rect">
+            <a:avLst/>
+          </a:prstGeom>
+        </p:spPr>
+      </p:pic>
+      <p:pic>
+        <p:nvPicPr>
+          <p:cNvPr id="18" name="Picture 17" descr="laptop.jpg"/>
+          <p:cNvPicPr>
+            <a:picLocks noChangeAspect="1"/>
+          </p:cNvPicPr>
+          <p:nvPr/>
+        </p:nvPicPr>
+        <p:blipFill>
+          <a:blip r:embed="rId8">
+            <a:extLst>
+              <a:ext uri="{28A0092B-C50C-407E-A947-70E740481C1C}">
+                <a14:useLocalDpi xmlns:a14="http://schemas.microsoft.com/office/drawing/2010/main" val="0"/>
+              </a:ext>
+            </a:extLst>
+          </a:blip>
+          <a:stretch>
+            <a:fillRect/>
+          </a:stretch>
+        </p:blipFill>
+        <p:spPr>
+          <a:xfrm>
+            <a:off x="3851778" y="313044"/>
+            <a:ext cx="1423053" cy="1067290"/>
+          </a:xfrm>
+          <a:prstGeom prst="rect">
+            <a:avLst/>
+          </a:prstGeom>
+        </p:spPr>
+      </p:pic>
+      <p:cxnSp>
+        <p:nvCxnSpPr>
+          <p:cNvPr id="21" name="Straight Arrow Connector 20"/>
+          <p:cNvCxnSpPr/>
+          <p:nvPr/>
+        </p:nvCxnSpPr>
+        <p:spPr>
+          <a:xfrm flipH="1">
+            <a:off x="3147563" y="1433907"/>
+            <a:ext cx="1094105" cy="785234"/>
+          </a:xfrm>
+          <a:prstGeom prst="straightConnector1">
+            <a:avLst/>
+          </a:prstGeom>
+          <a:ln>
+            <a:tailEnd type="arrow"/>
+          </a:ln>
+        </p:spPr>
+        <p:style>
+          <a:lnRef idx="2">
+            <a:schemeClr val="accent1"/>
+          </a:lnRef>
+          <a:fillRef idx="0">
+            <a:schemeClr val="accent1"/>
+          </a:fillRef>
+          <a:effectRef idx="1">
+            <a:schemeClr val="accent1"/>
+          </a:effectRef>
+          <a:fontRef idx="minor">
+            <a:schemeClr val="tx1"/>
+          </a:fontRef>
+        </p:style>
+      </p:cxnSp>
+      <p:cxnSp>
+        <p:nvCxnSpPr>
+          <p:cNvPr id="22" name="Straight Arrow Connector 21"/>
+          <p:cNvCxnSpPr/>
+          <p:nvPr/>
+        </p:nvCxnSpPr>
+        <p:spPr>
+          <a:xfrm>
+            <a:off x="3011611" y="3468689"/>
+            <a:ext cx="696990" cy="1003734"/>
+          </a:xfrm>
+          <a:prstGeom prst="straightConnector1">
+            <a:avLst/>
+          </a:prstGeom>
+          <a:ln>
+            <a:tailEnd type="arrow"/>
+          </a:ln>
+        </p:spPr>
+        <p:style>
+          <a:lnRef idx="2">
+            <a:schemeClr val="accent1"/>
+          </a:lnRef>
+          <a:fillRef idx="0">
+            <a:schemeClr val="accent1"/>
+          </a:fillRef>
+          <a:effectRef idx="1">
+            <a:schemeClr val="accent1"/>
+          </a:effectRef>
+          <a:fontRef idx="minor">
+            <a:schemeClr val="tx1"/>
+          </a:fontRef>
+        </p:style>
+      </p:cxnSp>
+      <p:sp>
+        <p:nvSpPr>
+          <p:cNvPr id="24" name="TextBox 23"/>
+          <p:cNvSpPr txBox="1"/>
+          <p:nvPr/>
+        </p:nvSpPr>
+        <p:spPr>
+          <a:xfrm>
+            <a:off x="2362416" y="1301901"/>
+            <a:ext cx="1393981" cy="461665"/>
+          </a:xfrm>
+          <a:prstGeom prst="rect">
+            <a:avLst/>
+          </a:prstGeom>
+          <a:noFill/>
+        </p:spPr>
+        <p:txBody>
+          <a:bodyPr wrap="none" rtlCol="0">
+            <a:spAutoFit/>
+          </a:bodyPr>
+          <a:lstStyle/>
+          <a:p>
+            <a:pPr algn="ctr"/>
+            <a:r>
+              <a:rPr lang="en-US" sz="1200" dirty="0" smtClean="0"/>
+              <a:t>URI</a:t>
+            </a:r>
+          </a:p>
+          <a:p>
+            <a:pPr algn="ctr"/>
+            <a:r>
+              <a:rPr lang="en-US" sz="1200" dirty="0" smtClean="0"/>
+              <a:t>(scoping + method)</a:t>
+            </a:r>
+            <a:endParaRPr lang="en-US" sz="1200" dirty="0"/>
+          </a:p>
+        </p:txBody>
+      </p:sp>
+      <p:cxnSp>
+        <p:nvCxnSpPr>
+          <p:cNvPr id="27" name="Straight Arrow Connector 26"/>
+          <p:cNvCxnSpPr/>
+          <p:nvPr/>
+        </p:nvCxnSpPr>
+        <p:spPr>
+          <a:xfrm flipH="1" flipV="1">
+            <a:off x="3147563" y="3316459"/>
+            <a:ext cx="704215" cy="1021420"/>
+          </a:xfrm>
+          <a:prstGeom prst="straightConnector1">
+            <a:avLst/>
+          </a:prstGeom>
+          <a:ln>
+            <a:tailEnd type="arrow"/>
+          </a:ln>
+        </p:spPr>
+        <p:style>
+          <a:lnRef idx="2">
+            <a:schemeClr val="accent1"/>
+          </a:lnRef>
+          <a:fillRef idx="0">
+            <a:schemeClr val="accent1"/>
+          </a:fillRef>
+          <a:effectRef idx="1">
+            <a:schemeClr val="accent1"/>
+          </a:effectRef>
+          <a:fontRef idx="minor">
+            <a:schemeClr val="tx1"/>
+          </a:fontRef>
+        </p:style>
+      </p:cxnSp>
+      <p:cxnSp>
+        <p:nvCxnSpPr>
+          <p:cNvPr id="37" name="Straight Arrow Connector 36"/>
+          <p:cNvCxnSpPr/>
+          <p:nvPr/>
+        </p:nvCxnSpPr>
+        <p:spPr>
+          <a:xfrm flipV="1">
+            <a:off x="3304608" y="1532734"/>
+            <a:ext cx="1112915" cy="816142"/>
+          </a:xfrm>
+          <a:prstGeom prst="straightConnector1">
+            <a:avLst/>
+          </a:prstGeom>
+          <a:ln>
+            <a:tailEnd type="arrow"/>
+          </a:ln>
+        </p:spPr>
+        <p:style>
+          <a:lnRef idx="2">
+            <a:schemeClr val="accent1"/>
+          </a:lnRef>
+          <a:fillRef idx="0">
+            <a:schemeClr val="accent1"/>
+          </a:fillRef>
+          <a:effectRef idx="1">
+            <a:schemeClr val="accent1"/>
+          </a:effectRef>
+          <a:fontRef idx="minor">
+            <a:schemeClr val="tx1"/>
+          </a:fontRef>
+        </p:style>
+      </p:cxnSp>
+      <p:sp>
+        <p:nvSpPr>
+          <p:cNvPr id="43" name="TextBox 42"/>
+          <p:cNvSpPr txBox="1"/>
+          <p:nvPr/>
+        </p:nvSpPr>
+        <p:spPr>
+          <a:xfrm>
+            <a:off x="5093421" y="488913"/>
+            <a:ext cx="701672" cy="369332"/>
+          </a:xfrm>
+          <a:prstGeom prst="rect">
+            <a:avLst/>
+          </a:prstGeom>
+          <a:noFill/>
+        </p:spPr>
+        <p:txBody>
+          <a:bodyPr wrap="none" rtlCol="0">
+            <a:spAutoFit/>
+          </a:bodyPr>
+          <a:lstStyle/>
+          <a:p>
+            <a:r>
+              <a:rPr lang="en-US" dirty="0" smtClean="0"/>
+              <a:t>client</a:t>
+            </a:r>
+            <a:endParaRPr lang="en-US" dirty="0"/>
+          </a:p>
+        </p:txBody>
+      </p:sp>
+      <p:cxnSp>
+        <p:nvCxnSpPr>
+          <p:cNvPr id="45" name="Straight Arrow Connector 44"/>
+          <p:cNvCxnSpPr/>
+          <p:nvPr/>
+        </p:nvCxnSpPr>
+        <p:spPr>
+          <a:xfrm flipV="1">
+            <a:off x="5440564" y="3400407"/>
+            <a:ext cx="1236929" cy="937472"/>
+          </a:xfrm>
+          <a:prstGeom prst="straightConnector1">
+            <a:avLst/>
+          </a:prstGeom>
+          <a:ln>
+            <a:tailEnd type="arrow"/>
+          </a:ln>
+        </p:spPr>
+        <p:style>
+          <a:lnRef idx="2">
+            <a:schemeClr val="accent1"/>
+          </a:lnRef>
+          <a:fillRef idx="0">
+            <a:schemeClr val="accent1"/>
+          </a:fillRef>
+          <a:effectRef idx="1">
+            <a:schemeClr val="accent1"/>
+          </a:effectRef>
+          <a:fontRef idx="minor">
+            <a:schemeClr val="tx1"/>
+          </a:fontRef>
+        </p:style>
+      </p:cxnSp>
+      <p:cxnSp>
+        <p:nvCxnSpPr>
+          <p:cNvPr id="52" name="Straight Arrow Connector 51"/>
+          <p:cNvCxnSpPr/>
+          <p:nvPr/>
+        </p:nvCxnSpPr>
+        <p:spPr>
+          <a:xfrm flipH="1" flipV="1">
+            <a:off x="5386045" y="1481704"/>
+            <a:ext cx="1291448" cy="737437"/>
+          </a:xfrm>
+          <a:prstGeom prst="straightConnector1">
+            <a:avLst/>
+          </a:prstGeom>
+          <a:ln>
+            <a:tailEnd type="arrow"/>
+          </a:ln>
+        </p:spPr>
+        <p:style>
+          <a:lnRef idx="2">
+            <a:schemeClr val="accent1"/>
+          </a:lnRef>
+          <a:fillRef idx="0">
+            <a:schemeClr val="accent1"/>
+          </a:fillRef>
+          <a:effectRef idx="1">
+            <a:schemeClr val="accent1"/>
+          </a:effectRef>
+          <a:fontRef idx="minor">
+            <a:schemeClr val="tx1"/>
+          </a:fontRef>
+        </p:style>
+      </p:cxnSp>
+      <p:sp>
+        <p:nvSpPr>
+          <p:cNvPr id="58" name="TextBox 57"/>
+          <p:cNvSpPr txBox="1"/>
+          <p:nvPr/>
+        </p:nvSpPr>
+        <p:spPr>
+          <a:xfrm>
+            <a:off x="5928743" y="1373506"/>
+            <a:ext cx="787395" cy="461665"/>
+          </a:xfrm>
+          <a:prstGeom prst="rect">
+            <a:avLst/>
+          </a:prstGeom>
+          <a:noFill/>
+        </p:spPr>
+        <p:txBody>
+          <a:bodyPr wrap="none" rtlCol="0">
+            <a:spAutoFit/>
+          </a:bodyPr>
+          <a:lstStyle/>
+          <a:p>
+            <a:pPr algn="ctr"/>
+            <a:r>
+              <a:rPr lang="en-US" sz="1200" dirty="0" smtClean="0"/>
+              <a:t>URI</a:t>
+            </a:r>
+          </a:p>
+          <a:p>
+            <a:pPr algn="ctr"/>
+            <a:r>
+              <a:rPr lang="en-US" sz="1200" dirty="0" smtClean="0"/>
+              <a:t>of results</a:t>
+            </a:r>
+            <a:endParaRPr lang="en-US" sz="1200" dirty="0"/>
+          </a:p>
+        </p:txBody>
+      </p:sp>
+      <p:sp>
+        <p:nvSpPr>
+          <p:cNvPr id="59" name="TextBox 58"/>
+          <p:cNvSpPr txBox="1"/>
+          <p:nvPr/>
+        </p:nvSpPr>
+        <p:spPr>
+          <a:xfrm>
+            <a:off x="3910481" y="1901174"/>
+            <a:ext cx="505667" cy="276999"/>
+          </a:xfrm>
+          <a:prstGeom prst="rect">
+            <a:avLst/>
+          </a:prstGeom>
+          <a:noFill/>
+        </p:spPr>
+        <p:txBody>
+          <a:bodyPr wrap="none" rtlCol="0">
+            <a:spAutoFit/>
+          </a:bodyPr>
+          <a:lstStyle/>
+          <a:p>
+            <a:pPr algn="ctr"/>
+            <a:r>
+              <a:rPr lang="en-US" sz="1200" dirty="0" smtClean="0"/>
+              <a:t>JSON</a:t>
+            </a:r>
+            <a:endParaRPr lang="en-US" sz="1200" dirty="0"/>
+          </a:p>
+        </p:txBody>
+      </p:sp>
     </p:spTree>
     <p:extLst>
       <p:ext uri="{BB962C8B-B14F-4D97-AF65-F5344CB8AC3E}">
-        <p14:creationId xmlns:p14="http://schemas.microsoft.com/office/powerpoint/2010/main" val="1555682506"/>
+        <p14:creationId xmlns:p14="http://schemas.microsoft.com/office/powerpoint/2010/main" val="3309824939"/>
       </p:ext>
     </p:extLst>
   </p:cSld>
   <p:clrMapOvr>
     <a:masterClrMapping/>
   </p:clrMapOvr>
-  <p:timing>
-    <p:tnLst>
-      <p:par>
-        <p:cTn xmlns:p14="http://schemas.microsoft.com/office/powerpoint/2010/main" id="1" dur="indefinite" restart="never" nodeType="tmRoot"/>
-      </p:par>
-    </p:tnLst>
-  </p:timing>
 </p:sld>
 </file>
 
@@ -8157,83 +9117,7 @@
       </p:grpSpPr>
       <p:sp>
         <p:nvSpPr>
-          <p:cNvPr id="2" name="Title 1"/>
-          <p:cNvSpPr>
-            <a:spLocks noGrp="1"/>
-          </p:cNvSpPr>
-          <p:nvPr>
-            <p:ph type="title"/>
-          </p:nvPr>
-        </p:nvSpPr>
-        <p:spPr>
-          <a:xfrm>
-            <a:off x="1880152" y="103800"/>
-            <a:ext cx="5762480" cy="1143000"/>
-          </a:xfrm>
-        </p:spPr>
-        <p:txBody>
-          <a:bodyPr/>
-          <a:lstStyle/>
-          <a:p>
-            <a:pPr algn="l"/>
-            <a:r>
-              <a:rPr lang="en-US" sz="3600" dirty="0" smtClean="0"/>
-              <a:t>Project Schedule Planned</a:t>
-            </a:r>
-            <a:endParaRPr lang="en-US" sz="3600" dirty="0"/>
-          </a:p>
-        </p:txBody>
-      </p:sp>
-      <p:pic>
-        <p:nvPicPr>
-          <p:cNvPr id="4" name="Picture 3"/>
-          <p:cNvPicPr>
-            <a:picLocks noChangeAspect="1"/>
-          </p:cNvPicPr>
-          <p:nvPr/>
-        </p:nvPicPr>
-        <p:blipFill rotWithShape="1">
-          <a:blip r:embed="rId2"/>
-          <a:srcRect r="1235"/>
-          <a:stretch/>
-        </p:blipFill>
-        <p:spPr>
-          <a:xfrm>
-            <a:off x="1394326" y="1230486"/>
-            <a:ext cx="6506412" cy="2371603"/>
-          </a:xfrm>
-          <a:prstGeom prst="rect">
-            <a:avLst/>
-          </a:prstGeom>
-        </p:spPr>
-      </p:pic>
-      <p:pic>
-        <p:nvPicPr>
-          <p:cNvPr id="7" name="Picture 6"/>
-          <p:cNvPicPr>
-            <a:picLocks noChangeAspect="1"/>
-          </p:cNvPicPr>
-          <p:nvPr/>
-        </p:nvPicPr>
-        <p:blipFill>
-          <a:blip r:embed="rId3"/>
-          <a:stretch>
-            <a:fillRect/>
-          </a:stretch>
-        </p:blipFill>
-        <p:spPr>
-          <a:xfrm>
-            <a:off x="581422" y="3532600"/>
-            <a:ext cx="5924550" cy="3219450"/>
-          </a:xfrm>
-          <a:prstGeom prst="rect">
-            <a:avLst/>
-          </a:prstGeom>
-        </p:spPr>
-      </p:pic>
-      <p:sp>
-        <p:nvSpPr>
-          <p:cNvPr id="8" name="Slide Number Placeholder 7"/>
+          <p:cNvPr id="4" name="Slide Number Placeholder 3"/>
           <p:cNvSpPr>
             <a:spLocks noGrp="1"/>
           </p:cNvSpPr>
@@ -8260,10 +9144,238 @@
           </a:p>
         </p:txBody>
       </p:sp>
+      <p:sp>
+        <p:nvSpPr>
+          <p:cNvPr id="5" name="Title 1"/>
+          <p:cNvSpPr>
+            <a:spLocks noGrp="1"/>
+          </p:cNvSpPr>
+          <p:nvPr>
+            <p:ph type="title"/>
+          </p:nvPr>
+        </p:nvSpPr>
+        <p:spPr>
+          <a:xfrm>
+            <a:off x="457200" y="274638"/>
+            <a:ext cx="8229600" cy="933940"/>
+          </a:xfrm>
+        </p:spPr>
+        <p:txBody>
+          <a:bodyPr/>
+          <a:lstStyle/>
+          <a:p>
+            <a:r>
+              <a:rPr lang="en-US" sz="3600" dirty="0" smtClean="0"/>
+              <a:t>Service Virtualization</a:t>
+            </a:r>
+            <a:endParaRPr lang="en-US" sz="3600" dirty="0"/>
+          </a:p>
+        </p:txBody>
+      </p:sp>
+      <p:sp>
+        <p:nvSpPr>
+          <p:cNvPr id="6" name="Content Placeholder 2"/>
+          <p:cNvSpPr>
+            <a:spLocks noGrp="1"/>
+          </p:cNvSpPr>
+          <p:nvPr>
+            <p:ph idx="1"/>
+          </p:nvPr>
+        </p:nvSpPr>
+        <p:spPr>
+          <a:xfrm>
+            <a:off x="457200" y="1433908"/>
+            <a:ext cx="8229600" cy="4692256"/>
+          </a:xfrm>
+        </p:spPr>
+        <p:txBody>
+          <a:bodyPr/>
+          <a:lstStyle/>
+          <a:p>
+            <a:r>
+              <a:rPr lang="en-US" sz="2000" dirty="0" smtClean="0">
+                <a:solidFill>
+                  <a:srgbClr val="000000"/>
+                </a:solidFill>
+                <a:latin typeface="Comic Sans MS" charset="0"/>
+              </a:rPr>
+              <a:t>Use </a:t>
+            </a:r>
+            <a:r>
+              <a:rPr lang="en-US" sz="2000" dirty="0" err="1" smtClean="0">
+                <a:solidFill>
+                  <a:srgbClr val="000000"/>
+                </a:solidFill>
+                <a:latin typeface="Comic Sans MS" charset="0"/>
+              </a:rPr>
+              <a:t>VMWare</a:t>
+            </a:r>
+            <a:r>
+              <a:rPr lang="en-US" sz="2000" dirty="0" smtClean="0">
+                <a:solidFill>
+                  <a:srgbClr val="000000"/>
+                </a:solidFill>
+                <a:latin typeface="Comic Sans MS" charset="0"/>
+              </a:rPr>
+              <a:t> (</a:t>
+            </a:r>
+            <a:r>
+              <a:rPr lang="en-US" sz="2000" dirty="0" err="1" smtClean="0">
+                <a:solidFill>
+                  <a:srgbClr val="000000"/>
+                </a:solidFill>
+                <a:latin typeface="Comic Sans MS" charset="0"/>
+              </a:rPr>
+              <a:t>VMPlayer</a:t>
+            </a:r>
+            <a:r>
+              <a:rPr lang="en-US" sz="2000" dirty="0" smtClean="0">
+                <a:solidFill>
+                  <a:srgbClr val="000000"/>
+                </a:solidFill>
+                <a:latin typeface="Comic Sans MS" charset="0"/>
+              </a:rPr>
+              <a:t>)</a:t>
+            </a:r>
+            <a:endParaRPr lang="en-US" sz="2000" dirty="0" smtClean="0">
+              <a:solidFill>
+                <a:srgbClr val="000000"/>
+              </a:solidFill>
+              <a:latin typeface="Comic Sans MS" charset="0"/>
+            </a:endParaRPr>
+          </a:p>
+          <a:p>
+            <a:pPr lvl="1"/>
+            <a:r>
+              <a:rPr lang="en-US" sz="2000" dirty="0" smtClean="0">
+                <a:solidFill>
+                  <a:srgbClr val="000000"/>
+                </a:solidFill>
+                <a:latin typeface="Comic Sans MS" charset="0"/>
+              </a:rPr>
+              <a:t>Host OS: </a:t>
+            </a:r>
+            <a:r>
+              <a:rPr lang="en-US" sz="2000" dirty="0" err="1" smtClean="0">
+                <a:solidFill>
+                  <a:srgbClr val="000000"/>
+                </a:solidFill>
+                <a:latin typeface="Comic Sans MS" charset="0"/>
+              </a:rPr>
+              <a:t>CentOS</a:t>
+            </a:r>
+            <a:r>
+              <a:rPr lang="en-US" sz="2000" dirty="0" smtClean="0">
+                <a:solidFill>
+                  <a:srgbClr val="000000"/>
+                </a:solidFill>
+                <a:latin typeface="Comic Sans MS" charset="0"/>
+              </a:rPr>
+              <a:t> (Linux)</a:t>
+            </a:r>
+          </a:p>
+          <a:p>
+            <a:pPr lvl="1"/>
+            <a:r>
+              <a:rPr lang="en-US" sz="2000" dirty="0" smtClean="0">
+                <a:solidFill>
+                  <a:srgbClr val="000000"/>
+                </a:solidFill>
+                <a:latin typeface="Comic Sans MS" charset="0"/>
+              </a:rPr>
+              <a:t>Guest OS: Ubuntu (Linux)</a:t>
+            </a:r>
+            <a:endParaRPr lang="en-US" sz="2000" dirty="0" smtClean="0">
+              <a:solidFill>
+                <a:srgbClr val="000000"/>
+              </a:solidFill>
+              <a:latin typeface="Comic Sans MS" charset="0"/>
+            </a:endParaRPr>
+          </a:p>
+          <a:p>
+            <a:pPr lvl="1"/>
+            <a:r>
+              <a:rPr lang="en-US" sz="2000" dirty="0" smtClean="0">
+                <a:solidFill>
+                  <a:srgbClr val="000000"/>
+                </a:solidFill>
+                <a:latin typeface="Comic Sans MS" charset="0"/>
+              </a:rPr>
+              <a:t>Open source software, python packages, etc. installed on guest OS</a:t>
+            </a:r>
+          </a:p>
+          <a:p>
+            <a:pPr lvl="1"/>
+            <a:r>
+              <a:rPr lang="en-US" sz="2000" dirty="0" smtClean="0">
+                <a:solidFill>
+                  <a:srgbClr val="000000"/>
+                </a:solidFill>
+                <a:latin typeface="Comic Sans MS" charset="0"/>
+              </a:rPr>
+              <a:t>Services deployed to guest OS</a:t>
+            </a:r>
+          </a:p>
+          <a:p>
+            <a:pPr lvl="1"/>
+            <a:r>
+              <a:rPr lang="en-US" sz="2000" dirty="0" smtClean="0">
+                <a:solidFill>
+                  <a:srgbClr val="000000"/>
+                </a:solidFill>
+                <a:latin typeface="Comic Sans MS" charset="0"/>
+              </a:rPr>
+              <a:t>Developers’ user accounts are on guest OS</a:t>
+            </a:r>
+          </a:p>
+          <a:p>
+            <a:pPr lvl="1"/>
+            <a:r>
+              <a:rPr lang="en-US" sz="2000" dirty="0" smtClean="0">
+                <a:solidFill>
+                  <a:srgbClr val="000000"/>
+                </a:solidFill>
+                <a:latin typeface="Comic Sans MS" charset="0"/>
+              </a:rPr>
+              <a:t>RAID disk, with 100TB capacity, is mapped from host OS to guest OS</a:t>
+            </a:r>
+          </a:p>
+          <a:p>
+            <a:pPr lvl="1"/>
+            <a:r>
+              <a:rPr lang="en-US" sz="2000" dirty="0" smtClean="0">
+                <a:solidFill>
+                  <a:srgbClr val="000000"/>
+                </a:solidFill>
+                <a:latin typeface="Comic Sans MS" charset="0"/>
+              </a:rPr>
+              <a:t>Host ports need to be open and forwarded to guest OS</a:t>
+            </a:r>
+          </a:p>
+          <a:p>
+            <a:pPr lvl="1"/>
+            <a:r>
+              <a:rPr lang="en-US" sz="2000" dirty="0" smtClean="0">
+                <a:solidFill>
+                  <a:srgbClr val="000000"/>
+                </a:solidFill>
+                <a:latin typeface="Comic Sans MS" charset="0"/>
+              </a:rPr>
+              <a:t>Benefits: guest OS runs on any host OS, so moving is quick; no need to reinstall all the dependent packages again</a:t>
+            </a:r>
+            <a:endParaRPr lang="en-US" sz="2000" dirty="0" smtClean="0">
+              <a:solidFill>
+                <a:srgbClr val="000000"/>
+              </a:solidFill>
+              <a:latin typeface="Comic Sans MS" charset="0"/>
+            </a:endParaRPr>
+          </a:p>
+        </p:txBody>
+      </p:sp>
     </p:spTree>
     <p:extLst>
       <p:ext uri="{BB962C8B-B14F-4D97-AF65-F5344CB8AC3E}">
-        <p14:creationId xmlns:p14="http://schemas.microsoft.com/office/powerpoint/2010/main" val="3130814812"/>
+        <p14:creationId xmlns:p14="http://schemas.microsoft.com/office/powerpoint/2010/main" val="1444776708"/>
       </p:ext>
     </p:extLst>
   </p:cSld>
@@ -8290,155 +9402,9 @@
           <a:chExt cx="0" cy="0"/>
         </a:xfrm>
       </p:grpSpPr>
-      <p:pic>
-        <p:nvPicPr>
-          <p:cNvPr id="4" name="Picture 3"/>
-          <p:cNvPicPr>
-            <a:picLocks noChangeAspect="1"/>
-          </p:cNvPicPr>
-          <p:nvPr/>
-        </p:nvPicPr>
-        <p:blipFill rotWithShape="1">
-          <a:blip r:embed="rId2"/>
-          <a:srcRect r="1235"/>
-          <a:stretch/>
-        </p:blipFill>
-        <p:spPr>
-          <a:xfrm>
-            <a:off x="1394326" y="1230486"/>
-            <a:ext cx="6506412" cy="2371603"/>
-          </a:xfrm>
-          <a:prstGeom prst="rect">
-            <a:avLst/>
-          </a:prstGeom>
-        </p:spPr>
-      </p:pic>
-      <p:sp>
-        <p:nvSpPr>
-          <p:cNvPr id="9" name="TextBox 8"/>
-          <p:cNvSpPr txBox="1"/>
-          <p:nvPr/>
-        </p:nvSpPr>
-        <p:spPr>
-          <a:xfrm>
-            <a:off x="7188119" y="3852573"/>
-            <a:ext cx="1470523" cy="261610"/>
-          </a:xfrm>
-          <a:prstGeom prst="rect">
-            <a:avLst/>
-          </a:prstGeom>
-          <a:solidFill>
-            <a:srgbClr val="008000"/>
-          </a:solidFill>
-        </p:spPr>
-        <p:txBody>
-          <a:bodyPr wrap="square" lIns="0" tIns="0" rIns="0" bIns="45720" rtlCol="0">
-            <a:spAutoFit/>
-          </a:bodyPr>
-          <a:lstStyle/>
-          <a:p>
-            <a:pPr algn="ctr"/>
-            <a:r>
-              <a:rPr lang="en-US" sz="1400" dirty="0" smtClean="0"/>
-              <a:t>Complete</a:t>
-            </a:r>
-            <a:endParaRPr lang="en-US" sz="1400" dirty="0"/>
-          </a:p>
-        </p:txBody>
-      </p:sp>
-      <p:sp>
-        <p:nvSpPr>
-          <p:cNvPr id="8" name="TextBox 7"/>
-          <p:cNvSpPr txBox="1"/>
-          <p:nvPr/>
-        </p:nvSpPr>
-        <p:spPr>
-          <a:xfrm>
-            <a:off x="7188120" y="4114183"/>
-            <a:ext cx="1470523" cy="261610"/>
-          </a:xfrm>
-          <a:prstGeom prst="rect">
-            <a:avLst/>
-          </a:prstGeom>
-          <a:solidFill>
-            <a:srgbClr val="FFE53E"/>
-          </a:solidFill>
-        </p:spPr>
-        <p:txBody>
-          <a:bodyPr wrap="square" lIns="0" tIns="0" rIns="0" bIns="45720" rtlCol="0">
-            <a:spAutoFit/>
-          </a:bodyPr>
-          <a:lstStyle/>
-          <a:p>
-            <a:pPr algn="ctr"/>
-            <a:r>
-              <a:rPr lang="en-US" sz="1400" dirty="0" smtClean="0"/>
-              <a:t>Partially complete</a:t>
-            </a:r>
-            <a:endParaRPr lang="en-US" sz="1400" dirty="0"/>
-          </a:p>
-        </p:txBody>
-      </p:sp>
-      <p:sp>
-        <p:nvSpPr>
-          <p:cNvPr id="10" name="TextBox 9"/>
-          <p:cNvSpPr txBox="1"/>
-          <p:nvPr/>
-        </p:nvSpPr>
-        <p:spPr>
-          <a:xfrm>
-            <a:off x="7188119" y="4370240"/>
-            <a:ext cx="1470524" cy="261610"/>
-          </a:xfrm>
-          <a:prstGeom prst="rect">
-            <a:avLst/>
-          </a:prstGeom>
-          <a:solidFill>
-            <a:srgbClr val="FF0000"/>
-          </a:solidFill>
-        </p:spPr>
-        <p:txBody>
-          <a:bodyPr wrap="square" lIns="0" tIns="0" rIns="0" bIns="45720" rtlCol="0">
-            <a:spAutoFit/>
-          </a:bodyPr>
-          <a:lstStyle/>
-          <a:p>
-            <a:pPr algn="ctr"/>
-            <a:r>
-              <a:rPr lang="en-US" sz="1400" dirty="0" smtClean="0"/>
-              <a:t>Not started</a:t>
-            </a:r>
-            <a:endParaRPr lang="en-US" sz="1400" dirty="0"/>
-          </a:p>
-        </p:txBody>
-      </p:sp>
-      <p:pic>
-        <p:nvPicPr>
-          <p:cNvPr id="14" name="Picture 13"/>
-          <p:cNvPicPr>
-            <a:picLocks noChangeAspect="1"/>
-          </p:cNvPicPr>
-          <p:nvPr/>
-        </p:nvPicPr>
-        <p:blipFill>
-          <a:blip r:embed="rId3"/>
-          <a:stretch>
-            <a:fillRect/>
-          </a:stretch>
-        </p:blipFill>
-        <p:spPr>
-          <a:xfrm>
-            <a:off x="600516" y="3544886"/>
-            <a:ext cx="5886450" cy="3200400"/>
-          </a:xfrm>
-          <a:prstGeom prst="rect">
-            <a:avLst/>
-          </a:prstGeom>
-        </p:spPr>
-      </p:pic>
-      <p:sp>
-        <p:nvSpPr>
-          <p:cNvPr id="16" name="Title 1"/>
+      <p:sp>
+        <p:nvSpPr>
+          <p:cNvPr id="2" name="Title 1"/>
           <p:cNvSpPr>
             <a:spLocks noGrp="1"/>
           </p:cNvSpPr>
@@ -8446,28 +9412,115 @@
             <p:ph type="title"/>
           </p:nvPr>
         </p:nvSpPr>
-        <p:spPr>
-          <a:xfrm>
-            <a:off x="1880152" y="103800"/>
-            <a:ext cx="5762480" cy="1143000"/>
-          </a:xfrm>
-        </p:spPr>
+        <p:spPr/>
         <p:txBody>
           <a:bodyPr/>
           <a:lstStyle/>
           <a:p>
-            <a:pPr algn="l"/>
-            <a:r>
-              <a:rPr lang="en-US" sz="3600" dirty="0" smtClean="0"/>
-              <a:t>Project Schedule Status</a:t>
-            </a:r>
-            <a:endParaRPr lang="en-US" sz="3600" dirty="0"/>
-          </a:p>
-        </p:txBody>
-      </p:sp>
-      <p:sp>
-        <p:nvSpPr>
-          <p:cNvPr id="17" name="Slide Number Placeholder 16"/>
+            <a:r>
+              <a:rPr lang="en-US" dirty="0" smtClean="0"/>
+              <a:t>Programmatic Status</a:t>
+            </a:r>
+            <a:endParaRPr lang="en-US" dirty="0"/>
+          </a:p>
+        </p:txBody>
+      </p:sp>
+      <p:sp>
+        <p:nvSpPr>
+          <p:cNvPr id="3" name="Content Placeholder 2"/>
+          <p:cNvSpPr>
+            <a:spLocks noGrp="1"/>
+          </p:cNvSpPr>
+          <p:nvPr>
+            <p:ph idx="1"/>
+          </p:nvPr>
+        </p:nvSpPr>
+        <p:spPr/>
+        <p:txBody>
+          <a:bodyPr/>
+          <a:lstStyle/>
+          <a:p>
+            <a:r>
+              <a:rPr lang="en-US" sz="2000" dirty="0" smtClean="0"/>
+              <a:t>This CMAC project started on October 1</a:t>
+            </a:r>
+            <a:r>
+              <a:rPr lang="en-US" sz="2000" baseline="30000" dirty="0" smtClean="0"/>
+              <a:t>st</a:t>
+            </a:r>
+            <a:r>
+              <a:rPr lang="en-US" sz="2000" dirty="0" smtClean="0"/>
+              <a:t>, 2012.</a:t>
+            </a:r>
+          </a:p>
+          <a:p>
+            <a:r>
+              <a:rPr lang="en-US" sz="2000" dirty="0" smtClean="0"/>
+              <a:t>This project total budget is $616K with $303K for year 1</a:t>
+            </a:r>
+            <a:r>
+              <a:rPr lang="en-US" sz="2000" dirty="0"/>
+              <a:t> </a:t>
+            </a:r>
+            <a:r>
+              <a:rPr lang="en-US" sz="2000" dirty="0" smtClean="0"/>
+              <a:t>and $313K for year 2.</a:t>
+            </a:r>
+          </a:p>
+          <a:p>
+            <a:r>
+              <a:rPr lang="en-US" sz="2000" dirty="0" smtClean="0"/>
+              <a:t>This project has 9 tasks, 5 deliverables, and 3 milestones. </a:t>
+            </a:r>
+          </a:p>
+          <a:p>
+            <a:r>
+              <a:rPr lang="en-US" sz="2000" dirty="0" smtClean="0"/>
+              <a:t>The schedule/order of the tasks is adjusted to improve the development cycle and support the new educational opportunity.</a:t>
+            </a:r>
+          </a:p>
+          <a:p>
+            <a:r>
+              <a:rPr lang="en-US" sz="2000" dirty="0" smtClean="0"/>
+              <a:t>4 tasks are partially completed and 1 task is delayed.</a:t>
+            </a:r>
+          </a:p>
+          <a:p>
+            <a:r>
+              <a:rPr lang="en-US" sz="2000" dirty="0" smtClean="0"/>
+              <a:t>The project cost is overrun by $16K as of the end of February.</a:t>
+            </a:r>
+          </a:p>
+          <a:p>
+            <a:r>
+              <a:rPr lang="en-US" sz="2000" dirty="0" smtClean="0"/>
+              <a:t>The overrun is due to the overrun in hardware purchase and installation. </a:t>
+            </a:r>
+          </a:p>
+          <a:p>
+            <a:r>
+              <a:rPr lang="en-US" sz="2000" dirty="0" smtClean="0"/>
+              <a:t>The overrun will be corrected </a:t>
+            </a:r>
+            <a:r>
+              <a:rPr lang="en-US" sz="2000" dirty="0"/>
+              <a:t>by the gradual reduction of the labor cost through the rest of the year. </a:t>
+            </a:r>
+          </a:p>
+          <a:p>
+            <a:pPr marL="0" indent="0">
+              <a:buNone/>
+            </a:pPr>
+            <a:r>
+              <a:rPr lang="en-US" sz="2000" dirty="0" smtClean="0"/>
+              <a:t>   </a:t>
+            </a:r>
+          </a:p>
+        </p:txBody>
+      </p:sp>
+      <p:sp>
+        <p:nvSpPr>
+          <p:cNvPr id="4" name="Slide Number Placeholder 3"/>
           <p:cNvSpPr>
             <a:spLocks noGrp="1"/>
           </p:cNvSpPr>
@@ -8497,13 +9550,20 @@
     </p:spTree>
     <p:extLst>
       <p:ext uri="{BB962C8B-B14F-4D97-AF65-F5344CB8AC3E}">
-        <p14:creationId xmlns:p14="http://schemas.microsoft.com/office/powerpoint/2010/main" val="125852812"/>
+        <p14:creationId xmlns:p14="http://schemas.microsoft.com/office/powerpoint/2010/main" val="1555682506"/>
       </p:ext>
     </p:extLst>
   </p:cSld>
   <p:clrMapOvr>
     <a:masterClrMapping/>
   </p:clrMapOvr>
+  <p:timing>
+    <p:tnLst>
+      <p:par>
+        <p:cTn xmlns:p14="http://schemas.microsoft.com/office/powerpoint/2010/main" id="1" dur="indefinite" restart="never" nodeType="tmRoot"/>
+      </p:par>
+    </p:tnLst>
+  </p:timing>
 </p:sld>
 </file>
 

</xml_diff>